<commit_message>
Partial update of frailty presentation
</commit_message>
<xml_diff>
--- a/frailty/frailty.pptx
+++ b/frailty/frailty.pptx
@@ -5,7 +5,7 @@
     <p:sldMasterId id="2147483648" r:id="rId1"/>
   </p:sldMasterIdLst>
   <p:notesMasterIdLst>
-    <p:notesMasterId r:id="rId21"/>
+    <p:notesMasterId r:id="rId24"/>
   </p:notesMasterIdLst>
   <p:sldIdLst>
     <p:sldId id="256" r:id="rId2"/>
@@ -27,6 +27,9 @@
     <p:sldId id="272" r:id="rId18"/>
     <p:sldId id="273" r:id="rId19"/>
     <p:sldId id="274" r:id="rId20"/>
+    <p:sldId id="275" r:id="rId21"/>
+    <p:sldId id="276" r:id="rId22"/>
+    <p:sldId id="277" r:id="rId23"/>
   </p:sldIdLst>
   <p:sldSz cx="9144000" cy="5143500" type="screen16x9"/>
   <p:notesSz cx="6858000" cy="9144000"/>
@@ -589,6 +592,996 @@
 </p:notes>
 </file>
 
+<file path=ppt/notesSlides/notesSlide10.xml><?xml version="1.0" encoding="utf-8"?>
+<p:notes xmlns:a="http://schemas.openxmlformats.org/drawingml/2006/main" xmlns:r="http://schemas.openxmlformats.org/officeDocument/2006/relationships" xmlns:p="http://schemas.openxmlformats.org/presentationml/2006/main">
+  <p:cSld>
+    <p:spTree>
+      <p:nvGrpSpPr>
+        <p:cNvPr id="1" name=""/>
+        <p:cNvGrpSpPr/>
+        <p:nvPr/>
+      </p:nvGrpSpPr>
+      <p:grpSpPr>
+        <a:xfrm>
+          <a:off x="0" y="0"/>
+          <a:ext cx="0" cy="0"/>
+          <a:chOff x="0" y="0"/>
+          <a:chExt cx="0" cy="0"/>
+        </a:xfrm>
+      </p:grpSpPr>
+      <p:sp>
+        <p:nvSpPr>
+          <p:cNvPr id="2" name="Slide Image Placeholder 1"/>
+          <p:cNvSpPr>
+            <a:spLocks noGrp="1" noRot="1" noChangeAspect="1"/>
+          </p:cNvSpPr>
+          <p:nvPr>
+            <p:ph type="sldImg"/>
+          </p:nvPr>
+        </p:nvSpPr>
+        <p:spPr/>
+      </p:sp>
+      <p:sp>
+        <p:nvSpPr>
+          <p:cNvPr id="3" name="Notes Placeholder 2"/>
+          <p:cNvSpPr>
+            <a:spLocks noGrp="1"/>
+          </p:cNvSpPr>
+          <p:nvPr>
+            <p:ph type="body" idx="1"/>
+          </p:nvPr>
+        </p:nvSpPr>
+        <p:spPr/>
+        <p:txBody>
+          <a:bodyPr/>
+          <a:lstStyle/>
+          <a:p>
+            <a:pPr lvl="0" indent="0" marL="0">
+              <a:buNone/>
+            </a:pPr>
+            <a:r>
+              <a:rPr/>
+              <a:t>The probability of a potential customer dying between the ages of 21 and 41 is 0.04638.</a:t>
+            </a:r>
+          </a:p>
+        </p:txBody>
+      </p:sp>
+      <p:sp>
+        <p:nvSpPr>
+          <p:cNvPr id="4" name="Slide Number Placeholder 3"/>
+          <p:cNvSpPr>
+            <a:spLocks noGrp="1"/>
+          </p:cNvSpPr>
+          <p:nvPr>
+            <p:ph type="sldNum" sz="quarter" idx="10"/>
+          </p:nvPr>
+        </p:nvSpPr>
+        <p:spPr/>
+        <p:txBody>
+          <a:bodyPr/>
+          <a:lstStyle/>
+          <a:p>
+            <a:fld id="{18BDFEC3-8487-43E8-A154-7C12CBC1FFF2}" type="slidenum">
+              <a:rPr lang="en-US"/>
+              <a:t>12</a:t>
+            </a:fld>
+            <a:endParaRPr lang="en-US"/>
+          </a:p>
+        </p:txBody>
+      </p:sp>
+    </p:spTree>
+  </p:cSld>
+</p:notes>
+</file>
+
+<file path=ppt/notesSlides/notesSlide11.xml><?xml version="1.0" encoding="utf-8"?>
+<p:notes xmlns:a="http://schemas.openxmlformats.org/drawingml/2006/main" xmlns:r="http://schemas.openxmlformats.org/officeDocument/2006/relationships" xmlns:p="http://schemas.openxmlformats.org/presentationml/2006/main">
+  <p:cSld>
+    <p:spTree>
+      <p:nvGrpSpPr>
+        <p:cNvPr id="1" name=""/>
+        <p:cNvGrpSpPr/>
+        <p:nvPr/>
+      </p:nvGrpSpPr>
+      <p:grpSpPr>
+        <a:xfrm>
+          <a:off x="0" y="0"/>
+          <a:ext cx="0" cy="0"/>
+          <a:chOff x="0" y="0"/>
+          <a:chExt cx="0" cy="0"/>
+        </a:xfrm>
+      </p:grpSpPr>
+      <p:sp>
+        <p:nvSpPr>
+          <p:cNvPr id="2" name="Slide Image Placeholder 1"/>
+          <p:cNvSpPr>
+            <a:spLocks noGrp="1" noRot="1" noChangeAspect="1"/>
+          </p:cNvSpPr>
+          <p:nvPr>
+            <p:ph type="sldImg"/>
+          </p:nvPr>
+        </p:nvSpPr>
+        <p:spPr/>
+      </p:sp>
+      <p:sp>
+        <p:nvSpPr>
+          <p:cNvPr id="3" name="Notes Placeholder 2"/>
+          <p:cNvSpPr>
+            <a:spLocks noGrp="1"/>
+          </p:cNvSpPr>
+          <p:nvPr>
+            <p:ph type="body" idx="1"/>
+          </p:nvPr>
+        </p:nvSpPr>
+        <p:spPr/>
+        <p:txBody>
+          <a:bodyPr/>
+          <a:lstStyle/>
+          <a:p>
+            <a:pPr lvl="0" indent="0" marL="0">
+              <a:buNone/>
+            </a:pPr>
+            <a:r>
+              <a:rPr/>
+              <a:t>The probability of a potential customer dying between the ages of 95 and 99 is about the same, 0.04626. So should you charge the same amount for an insurance policy for someone 21 years old and someone 95 years old?</a:t>
+            </a:r>
+          </a:p>
+        </p:txBody>
+      </p:sp>
+      <p:sp>
+        <p:nvSpPr>
+          <p:cNvPr id="4" name="Slide Number Placeholder 3"/>
+          <p:cNvSpPr>
+            <a:spLocks noGrp="1"/>
+          </p:cNvSpPr>
+          <p:nvPr>
+            <p:ph type="sldNum" sz="quarter" idx="10"/>
+          </p:nvPr>
+        </p:nvSpPr>
+        <p:spPr/>
+        <p:txBody>
+          <a:bodyPr/>
+          <a:lstStyle/>
+          <a:p>
+            <a:fld id="{18BDFEC3-8487-43E8-A154-7C12CBC1FFF2}" type="slidenum">
+              <a:rPr lang="en-US"/>
+              <a:t>13</a:t>
+            </a:fld>
+            <a:endParaRPr lang="en-US"/>
+          </a:p>
+        </p:txBody>
+      </p:sp>
+    </p:spTree>
+  </p:cSld>
+</p:notes>
+</file>
+
+<file path=ppt/notesSlides/notesSlide12.xml><?xml version="1.0" encoding="utf-8"?>
+<p:notes xmlns:a="http://schemas.openxmlformats.org/drawingml/2006/main" xmlns:r="http://schemas.openxmlformats.org/officeDocument/2006/relationships" xmlns:p="http://schemas.openxmlformats.org/presentationml/2006/main">
+  <p:cSld>
+    <p:spTree>
+      <p:nvGrpSpPr>
+        <p:cNvPr id="1" name=""/>
+        <p:cNvGrpSpPr/>
+        <p:nvPr/>
+      </p:nvGrpSpPr>
+      <p:grpSpPr>
+        <a:xfrm>
+          <a:off x="0" y="0"/>
+          <a:ext cx="0" cy="0"/>
+          <a:chOff x="0" y="0"/>
+          <a:chExt cx="0" cy="0"/>
+        </a:xfrm>
+      </p:grpSpPr>
+      <p:sp>
+        <p:nvSpPr>
+          <p:cNvPr id="2" name="Slide Image Placeholder 1"/>
+          <p:cNvSpPr>
+            <a:spLocks noGrp="1" noRot="1" noChangeAspect="1"/>
+          </p:cNvSpPr>
+          <p:nvPr>
+            <p:ph type="sldImg"/>
+          </p:nvPr>
+        </p:nvSpPr>
+        <p:spPr/>
+      </p:sp>
+      <p:sp>
+        <p:nvSpPr>
+          <p:cNvPr id="3" name="Notes Placeholder 2"/>
+          <p:cNvSpPr>
+            <a:spLocks noGrp="1"/>
+          </p:cNvSpPr>
+          <p:nvPr>
+            <p:ph type="body" idx="1"/>
+          </p:nvPr>
+        </p:nvSpPr>
+        <p:spPr/>
+        <p:txBody>
+          <a:bodyPr/>
+          <a:lstStyle/>
+          <a:p>
+            <a:pPr lvl="0" indent="0" marL="0">
+              <a:buNone/>
+            </a:pPr>
+            <a:r>
+              <a:rPr/>
+              <a:t>Obviously not. There are three things you need to fix first.</a:t>
+            </a:r>
+          </a:p>
+          <a:p>
+            <a:pPr lvl="0" indent="0" marL="0">
+              <a:buNone/>
+            </a:pPr>
+          </a:p>
+          <a:p>
+            <a:pPr lvl="0" indent="0" marL="0">
+              <a:buNone/>
+            </a:pPr>
+            <a:r>
+              <a:rPr/>
+              <a:t>The most obvious flaw is the unequal time intervals, 20 years for the first probability and 4 years for the second probability.</a:t>
+            </a:r>
+          </a:p>
+          <a:p>
+            <a:pPr lvl="0" indent="0" marL="0">
+              <a:buNone/>
+            </a:pPr>
+          </a:p>
+          <a:p>
+            <a:pPr lvl="0" indent="0" marL="0">
+              <a:buNone/>
+            </a:pPr>
+            <a:r>
+              <a:rPr/>
+              <a:t>You can fix this by computing a rate. You get the rate by dividing the probability by the width of the time interval.</a:t>
+            </a:r>
+          </a:p>
+          <a:p>
+            <a:pPr lvl="0" indent="0" marL="0">
+              <a:buNone/>
+            </a:pPr>
+          </a:p>
+          <a:p>
+            <a:pPr lvl="0" indent="0" marL="0">
+              <a:buNone/>
+            </a:pPr>
+            <a:r>
+              <a:rPr/>
+              <a:t>The second flaw is that the probability changes over the interval, increasing in the first case and decreasing in the second case.</a:t>
+            </a:r>
+          </a:p>
+          <a:p>
+            <a:pPr lvl="0" indent="0" marL="0">
+              <a:buNone/>
+            </a:pPr>
+          </a:p>
+          <a:p>
+            <a:pPr lvl="0" indent="0" marL="0">
+              <a:buNone/>
+            </a:pPr>
+            <a:r>
+              <a:rPr/>
+              <a:t>You can fix this by shrinking the width of the time interval.</a:t>
+            </a:r>
+          </a:p>
+          <a:p>
+            <a:pPr lvl="0" indent="0" marL="0">
+              <a:buNone/>
+            </a:pPr>
+          </a:p>
+          <a:p>
+            <a:pPr lvl="0" indent="0" marL="0">
+              <a:buNone/>
+            </a:pPr>
+            <a:r>
+              <a:rPr/>
+              <a:t>The third flaw is a bit more subtle. The probability of dying between the ages of 95 and 99 are probabilities computed from the perspective of a newborn child. That probability is small not because the chances of dying are small at that age, but because so many have died before their 95th birthday.</a:t>
+            </a:r>
+          </a:p>
+          <a:p>
+            <a:pPr lvl="0" indent="0" marL="0">
+              <a:buNone/>
+            </a:pPr>
+          </a:p>
+          <a:p>
+            <a:pPr lvl="0" indent="0" marL="0">
+              <a:buNone/>
+            </a:pPr>
+            <a:r>
+              <a:rPr/>
+              <a:t>If you are in insurance sales, you do not sell policies to newborn infants. You sell to people who have survived to a certain age. No one rises from their grave on their 95th birthday and asks for an insurance policy. First, because zombies aren’t real, and second the zombie who died prior to year 95 would not be able to collect on an insurance policy that paid off for a death between 95 and 99.</a:t>
+            </a:r>
+          </a:p>
+          <a:p>
+            <a:pPr lvl="0" indent="0" marL="0">
+              <a:buNone/>
+            </a:pPr>
+          </a:p>
+          <a:p>
+            <a:pPr lvl="0" indent="0" marL="0">
+              <a:buNone/>
+            </a:pPr>
+            <a:r>
+              <a:rPr/>
+              <a:t>You can fix this by dividing by the survivor probability.</a:t>
+            </a:r>
+          </a:p>
+        </p:txBody>
+      </p:sp>
+      <p:sp>
+        <p:nvSpPr>
+          <p:cNvPr id="4" name="Slide Number Placeholder 3"/>
+          <p:cNvSpPr>
+            <a:spLocks noGrp="1"/>
+          </p:cNvSpPr>
+          <p:nvPr>
+            <p:ph type="sldNum" sz="quarter" idx="10"/>
+          </p:nvPr>
+        </p:nvSpPr>
+        <p:spPr/>
+        <p:txBody>
+          <a:bodyPr/>
+          <a:lstStyle/>
+          <a:p>
+            <a:fld id="{18BDFEC3-8487-43E8-A154-7C12CBC1FFF2}" type="slidenum">
+              <a:rPr lang="en-US"/>
+              <a:t>14</a:t>
+            </a:fld>
+            <a:endParaRPr lang="en-US"/>
+          </a:p>
+        </p:txBody>
+      </p:sp>
+    </p:spTree>
+  </p:cSld>
+</p:notes>
+</file>
+
+<file path=ppt/notesSlides/notesSlide13.xml><?xml version="1.0" encoding="utf-8"?>
+<p:notes xmlns:a="http://schemas.openxmlformats.org/drawingml/2006/main" xmlns:r="http://schemas.openxmlformats.org/officeDocument/2006/relationships" xmlns:p="http://schemas.openxmlformats.org/presentationml/2006/main">
+  <p:cSld>
+    <p:spTree>
+      <p:nvGrpSpPr>
+        <p:cNvPr id="1" name=""/>
+        <p:cNvGrpSpPr/>
+        <p:nvPr/>
+      </p:nvGrpSpPr>
+      <p:grpSpPr>
+        <a:xfrm>
+          <a:off x="0" y="0"/>
+          <a:ext cx="0" cy="0"/>
+          <a:chOff x="0" y="0"/>
+          <a:chExt cx="0" cy="0"/>
+        </a:xfrm>
+      </p:grpSpPr>
+      <p:sp>
+        <p:nvSpPr>
+          <p:cNvPr id="2" name="Slide Image Placeholder 1"/>
+          <p:cNvSpPr>
+            <a:spLocks noGrp="1" noRot="1" noChangeAspect="1"/>
+          </p:cNvSpPr>
+          <p:nvPr>
+            <p:ph type="sldImg"/>
+          </p:nvPr>
+        </p:nvSpPr>
+        <p:spPr/>
+      </p:sp>
+      <p:sp>
+        <p:nvSpPr>
+          <p:cNvPr id="3" name="Notes Placeholder 2"/>
+          <p:cNvSpPr>
+            <a:spLocks noGrp="1"/>
+          </p:cNvSpPr>
+          <p:nvPr>
+            <p:ph type="body" idx="1"/>
+          </p:nvPr>
+        </p:nvSpPr>
+        <p:spPr/>
+        <p:txBody>
+          <a:bodyPr/>
+          <a:lstStyle/>
+          <a:p>
+            <a:pPr lvl="0" indent="0" marL="0">
+              <a:buNone/>
+            </a:pPr>
+            <a:r>
+              <a:rPr/>
+              <a:t>The hazard function addresses all three of the concerns mentioned above. It computes a rate by dividing by </a:t>
+            </a:r>
+            <a:r>
+              <a:rPr/>
+              <a:t>\Delta t</a:t>
+            </a:r>
+            <a:r>
+              <a:rPr/>
+              <a:t>. It shrinks the interval but using a limit. And it adjusts for survivorship by dividing by the survivor probability.</a:t>
+            </a:r>
+          </a:p>
+        </p:txBody>
+      </p:sp>
+      <p:sp>
+        <p:nvSpPr>
+          <p:cNvPr id="4" name="Slide Number Placeholder 3"/>
+          <p:cNvSpPr>
+            <a:spLocks noGrp="1"/>
+          </p:cNvSpPr>
+          <p:nvPr>
+            <p:ph type="sldNum" sz="quarter" idx="10"/>
+          </p:nvPr>
+        </p:nvSpPr>
+        <p:spPr/>
+        <p:txBody>
+          <a:bodyPr/>
+          <a:lstStyle/>
+          <a:p>
+            <a:fld id="{18BDFEC3-8487-43E8-A154-7C12CBC1FFF2}" type="slidenum">
+              <a:rPr lang="en-US"/>
+              <a:t>15</a:t>
+            </a:fld>
+            <a:endParaRPr lang="en-US"/>
+          </a:p>
+        </p:txBody>
+      </p:sp>
+    </p:spTree>
+  </p:cSld>
+</p:notes>
+</file>
+
+<file path=ppt/notesSlides/notesSlide14.xml><?xml version="1.0" encoding="utf-8"?>
+<p:notes xmlns:a="http://schemas.openxmlformats.org/drawingml/2006/main" xmlns:r="http://schemas.openxmlformats.org/officeDocument/2006/relationships" xmlns:p="http://schemas.openxmlformats.org/presentationml/2006/main">
+  <p:cSld>
+    <p:spTree>
+      <p:nvGrpSpPr>
+        <p:cNvPr id="1" name=""/>
+        <p:cNvGrpSpPr/>
+        <p:nvPr/>
+      </p:nvGrpSpPr>
+      <p:grpSpPr>
+        <a:xfrm>
+          <a:off x="0" y="0"/>
+          <a:ext cx="0" cy="0"/>
+          <a:chOff x="0" y="0"/>
+          <a:chExt cx="0" cy="0"/>
+        </a:xfrm>
+      </p:grpSpPr>
+      <p:sp>
+        <p:nvSpPr>
+          <p:cNvPr id="2" name="Slide Image Placeholder 1"/>
+          <p:cNvSpPr>
+            <a:spLocks noGrp="1" noRot="1" noChangeAspect="1"/>
+          </p:cNvSpPr>
+          <p:nvPr>
+            <p:ph type="sldImg"/>
+          </p:nvPr>
+        </p:nvSpPr>
+        <p:spPr/>
+      </p:sp>
+      <p:sp>
+        <p:nvSpPr>
+          <p:cNvPr id="3" name="Notes Placeholder 2"/>
+          <p:cNvSpPr>
+            <a:spLocks noGrp="1"/>
+          </p:cNvSpPr>
+          <p:nvPr>
+            <p:ph type="body" idx="1"/>
+          </p:nvPr>
+        </p:nvSpPr>
+        <p:spPr/>
+        <p:txBody>
+          <a:bodyPr/>
+          <a:lstStyle/>
+          <a:p>
+            <a:pPr lvl="0" indent="0" marL="0">
+              <a:buNone/>
+            </a:pPr>
+            <a:r>
+              <a:rPr/>
+              <a:t>This is what the hazard function for mortality data looks like.</a:t>
+            </a:r>
+          </a:p>
+        </p:txBody>
+      </p:sp>
+      <p:sp>
+        <p:nvSpPr>
+          <p:cNvPr id="4" name="Slide Number Placeholder 3"/>
+          <p:cNvSpPr>
+            <a:spLocks noGrp="1"/>
+          </p:cNvSpPr>
+          <p:nvPr>
+            <p:ph type="sldNum" sz="quarter" idx="10"/>
+          </p:nvPr>
+        </p:nvSpPr>
+        <p:spPr/>
+        <p:txBody>
+          <a:bodyPr/>
+          <a:lstStyle/>
+          <a:p>
+            <a:fld id="{18BDFEC3-8487-43E8-A154-7C12CBC1FFF2}" type="slidenum">
+              <a:rPr lang="en-US"/>
+              <a:t>16</a:t>
+            </a:fld>
+            <a:endParaRPr lang="en-US"/>
+          </a:p>
+        </p:txBody>
+      </p:sp>
+    </p:spTree>
+  </p:cSld>
+</p:notes>
+</file>
+
+<file path=ppt/notesSlides/notesSlide15.xml><?xml version="1.0" encoding="utf-8"?>
+<p:notes xmlns:a="http://schemas.openxmlformats.org/drawingml/2006/main" xmlns:r="http://schemas.openxmlformats.org/officeDocument/2006/relationships" xmlns:p="http://schemas.openxmlformats.org/presentationml/2006/main">
+  <p:cSld>
+    <p:spTree>
+      <p:nvGrpSpPr>
+        <p:cNvPr id="1" name=""/>
+        <p:cNvGrpSpPr/>
+        <p:nvPr/>
+      </p:nvGrpSpPr>
+      <p:grpSpPr>
+        <a:xfrm>
+          <a:off x="0" y="0"/>
+          <a:ext cx="0" cy="0"/>
+          <a:chOff x="0" y="0"/>
+          <a:chExt cx="0" cy="0"/>
+        </a:xfrm>
+      </p:grpSpPr>
+      <p:sp>
+        <p:nvSpPr>
+          <p:cNvPr id="2" name="Slide Image Placeholder 1"/>
+          <p:cNvSpPr>
+            <a:spLocks noGrp="1" noRot="1" noChangeAspect="1"/>
+          </p:cNvSpPr>
+          <p:nvPr>
+            <p:ph type="sldImg"/>
+          </p:nvPr>
+        </p:nvSpPr>
+        <p:spPr/>
+      </p:sp>
+      <p:sp>
+        <p:nvSpPr>
+          <p:cNvPr id="3" name="Notes Placeholder 2"/>
+          <p:cNvSpPr>
+            <a:spLocks noGrp="1"/>
+          </p:cNvSpPr>
+          <p:nvPr>
+            <p:ph type="body" idx="1"/>
+          </p:nvPr>
+        </p:nvSpPr>
+        <p:spPr/>
+        <p:txBody>
+          <a:bodyPr/>
+          <a:lstStyle/>
+          <a:p>
+            <a:pPr lvl="0" indent="0" marL="0">
+              <a:buNone/>
+            </a:pPr>
+            <a:r>
+              <a:rPr/>
+              <a:t>The pattern becomes a bit clearer when you look at the hazard function on a log scale. The risk of death is high early in your life, but drops. There is a safe period during your pre-teen and early teen years, but then the risk rises because of an increase in deaths associated with things like driving, alcohol, and other drugs. Some of that fades as you mature but other risks increase because of the unavoidable aging of your body.</a:t>
+            </a:r>
+          </a:p>
+        </p:txBody>
+      </p:sp>
+      <p:sp>
+        <p:nvSpPr>
+          <p:cNvPr id="4" name="Slide Number Placeholder 3"/>
+          <p:cNvSpPr>
+            <a:spLocks noGrp="1"/>
+          </p:cNvSpPr>
+          <p:nvPr>
+            <p:ph type="sldNum" sz="quarter" idx="10"/>
+          </p:nvPr>
+        </p:nvSpPr>
+        <p:spPr/>
+        <p:txBody>
+          <a:bodyPr/>
+          <a:lstStyle/>
+          <a:p>
+            <a:fld id="{18BDFEC3-8487-43E8-A154-7C12CBC1FFF2}" type="slidenum">
+              <a:rPr lang="en-US"/>
+              <a:t>17</a:t>
+            </a:fld>
+            <a:endParaRPr lang="en-US"/>
+          </a:p>
+        </p:txBody>
+      </p:sp>
+    </p:spTree>
+  </p:cSld>
+</p:notes>
+</file>
+
+<file path=ppt/notesSlides/notesSlide16.xml><?xml version="1.0" encoding="utf-8"?>
+<p:notes xmlns:a="http://schemas.openxmlformats.org/drawingml/2006/main" xmlns:r="http://schemas.openxmlformats.org/officeDocument/2006/relationships" xmlns:p="http://schemas.openxmlformats.org/presentationml/2006/main">
+  <p:cSld>
+    <p:spTree>
+      <p:nvGrpSpPr>
+        <p:cNvPr id="1" name=""/>
+        <p:cNvGrpSpPr/>
+        <p:nvPr/>
+      </p:nvGrpSpPr>
+      <p:grpSpPr>
+        <a:xfrm>
+          <a:off x="0" y="0"/>
+          <a:ext cx="0" cy="0"/>
+          <a:chOff x="0" y="0"/>
+          <a:chExt cx="0" cy="0"/>
+        </a:xfrm>
+      </p:grpSpPr>
+      <p:sp>
+        <p:nvSpPr>
+          <p:cNvPr id="2" name="Slide Image Placeholder 1"/>
+          <p:cNvSpPr>
+            <a:spLocks noGrp="1" noRot="1" noChangeAspect="1"/>
+          </p:cNvSpPr>
+          <p:nvPr>
+            <p:ph type="sldImg"/>
+          </p:nvPr>
+        </p:nvSpPr>
+        <p:spPr/>
+      </p:sp>
+      <p:sp>
+        <p:nvSpPr>
+          <p:cNvPr id="3" name="Notes Placeholder 2"/>
+          <p:cNvSpPr>
+            <a:spLocks noGrp="1"/>
+          </p:cNvSpPr>
+          <p:nvPr>
+            <p:ph type="body" idx="1"/>
+          </p:nvPr>
+        </p:nvSpPr>
+        <p:spPr/>
+        <p:txBody>
+          <a:bodyPr/>
+          <a:lstStyle/>
+          <a:p>
+            <a:pPr lvl="0" indent="0" marL="0">
+              <a:buNone/>
+            </a:pPr>
+            <a:r>
+              <a:rPr/>
+              <a:t>The hazard function provides the foundation for much work in survival analysis. This paper by Sir David Roxbee Cox introduced the proportional hazards regression model, also known as the Cox regression model. This paper has been cited over 28,000 times and represents the 24th most cited research paper in any field, according to a 2014 publication in Nature.</a:t>
+            </a:r>
+          </a:p>
+        </p:txBody>
+      </p:sp>
+      <p:sp>
+        <p:nvSpPr>
+          <p:cNvPr id="4" name="Slide Number Placeholder 3"/>
+          <p:cNvSpPr>
+            <a:spLocks noGrp="1"/>
+          </p:cNvSpPr>
+          <p:nvPr>
+            <p:ph type="sldNum" sz="quarter" idx="10"/>
+          </p:nvPr>
+        </p:nvSpPr>
+        <p:spPr/>
+        <p:txBody>
+          <a:bodyPr/>
+          <a:lstStyle/>
+          <a:p>
+            <a:fld id="{18BDFEC3-8487-43E8-A154-7C12CBC1FFF2}" type="slidenum">
+              <a:rPr lang="en-US"/>
+              <a:t>18</a:t>
+            </a:fld>
+            <a:endParaRPr lang="en-US"/>
+          </a:p>
+        </p:txBody>
+      </p:sp>
+    </p:spTree>
+  </p:cSld>
+</p:notes>
+</file>
+
+<file path=ppt/notesSlides/notesSlide17.xml><?xml version="1.0" encoding="utf-8"?>
+<p:notes xmlns:a="http://schemas.openxmlformats.org/drawingml/2006/main" xmlns:r="http://schemas.openxmlformats.org/officeDocument/2006/relationships" xmlns:p="http://schemas.openxmlformats.org/presentationml/2006/main">
+  <p:cSld>
+    <p:spTree>
+      <p:nvGrpSpPr>
+        <p:cNvPr id="1" name=""/>
+        <p:cNvGrpSpPr/>
+        <p:nvPr/>
+      </p:nvGrpSpPr>
+      <p:grpSpPr>
+        <a:xfrm>
+          <a:off x="0" y="0"/>
+          <a:ext cx="0" cy="0"/>
+          <a:chOff x="0" y="0"/>
+          <a:chExt cx="0" cy="0"/>
+        </a:xfrm>
+      </p:grpSpPr>
+      <p:sp>
+        <p:nvSpPr>
+          <p:cNvPr id="2" name="Slide Image Placeholder 1"/>
+          <p:cNvSpPr>
+            <a:spLocks noGrp="1" noRot="1" noChangeAspect="1"/>
+          </p:cNvSpPr>
+          <p:nvPr>
+            <p:ph type="sldImg"/>
+          </p:nvPr>
+        </p:nvSpPr>
+        <p:spPr/>
+      </p:sp>
+      <p:sp>
+        <p:nvSpPr>
+          <p:cNvPr id="3" name="Notes Placeholder 2"/>
+          <p:cNvSpPr>
+            <a:spLocks noGrp="1"/>
+          </p:cNvSpPr>
+          <p:nvPr>
+            <p:ph type="body" idx="1"/>
+          </p:nvPr>
+        </p:nvSpPr>
+        <p:spPr/>
+        <p:txBody>
+          <a:bodyPr/>
+          <a:lstStyle/>
+          <a:p>
+            <a:pPr lvl="0" indent="0" marL="0">
+              <a:buNone/>
+            </a:pPr>
+            <a:r>
+              <a:rPr/>
+              <a:t>The Cox regression model states that the hazard function for a particular value of the independent variable is the exponential of X beta times a baseline hazard, h0. If you compare the hazard function at two levels of the covariate, Xi and Xj, the hazard function changes by a proportion equal to exp((Xi-Xj)).</a:t>
+            </a:r>
+          </a:p>
+        </p:txBody>
+      </p:sp>
+      <p:sp>
+        <p:nvSpPr>
+          <p:cNvPr id="4" name="Slide Number Placeholder 3"/>
+          <p:cNvSpPr>
+            <a:spLocks noGrp="1"/>
+          </p:cNvSpPr>
+          <p:nvPr>
+            <p:ph type="sldNum" sz="quarter" idx="10"/>
+          </p:nvPr>
+        </p:nvSpPr>
+        <p:spPr/>
+        <p:txBody>
+          <a:bodyPr/>
+          <a:lstStyle/>
+          <a:p>
+            <a:fld id="{18BDFEC3-8487-43E8-A154-7C12CBC1FFF2}" type="slidenum">
+              <a:rPr lang="en-US"/>
+              <a:t>19</a:t>
+            </a:fld>
+            <a:endParaRPr lang="en-US"/>
+          </a:p>
+        </p:txBody>
+      </p:sp>
+    </p:spTree>
+  </p:cSld>
+</p:notes>
+</file>
+
+<file path=ppt/notesSlides/notesSlide18.xml><?xml version="1.0" encoding="utf-8"?>
+<p:notes xmlns:a="http://schemas.openxmlformats.org/drawingml/2006/main" xmlns:r="http://schemas.openxmlformats.org/officeDocument/2006/relationships" xmlns:p="http://schemas.openxmlformats.org/presentationml/2006/main">
+  <p:cSld>
+    <p:spTree>
+      <p:nvGrpSpPr>
+        <p:cNvPr id="1" name=""/>
+        <p:cNvGrpSpPr/>
+        <p:nvPr/>
+      </p:nvGrpSpPr>
+      <p:grpSpPr>
+        <a:xfrm>
+          <a:off x="0" y="0"/>
+          <a:ext cx="0" cy="0"/>
+          <a:chOff x="0" y="0"/>
+          <a:chExt cx="0" cy="0"/>
+        </a:xfrm>
+      </p:grpSpPr>
+      <p:sp>
+        <p:nvSpPr>
+          <p:cNvPr id="2" name="Slide Image Placeholder 1"/>
+          <p:cNvSpPr>
+            <a:spLocks noGrp="1" noRot="1" noChangeAspect="1"/>
+          </p:cNvSpPr>
+          <p:nvPr>
+            <p:ph type="sldImg"/>
+          </p:nvPr>
+        </p:nvSpPr>
+        <p:spPr/>
+      </p:sp>
+      <p:sp>
+        <p:nvSpPr>
+          <p:cNvPr id="3" name="Notes Placeholder 2"/>
+          <p:cNvSpPr>
+            <a:spLocks noGrp="1"/>
+          </p:cNvSpPr>
+          <p:nvPr>
+            <p:ph type="body" idx="1"/>
+          </p:nvPr>
+        </p:nvSpPr>
+        <p:spPr/>
+        <p:txBody>
+          <a:bodyPr/>
+          <a:lstStyle/>
+          <a:p>
+            <a:pPr lvl="0" indent="0" marL="0">
+              <a:buNone/>
+            </a:pPr>
+            <a:r>
+              <a:rPr/>
+              <a:t>A maximum likelihood approach to estimation does not work well because the hazard function burns up too many degrees of freedom. But you can compute a partial likelihood. The estimates from a Cox regression maximize this partial likelihood.</a:t>
+            </a:r>
+          </a:p>
+          <a:p>
+            <a:pPr lvl="0" indent="0" marL="0">
+              <a:buNone/>
+            </a:pPr>
+          </a:p>
+          <a:p>
+            <a:pPr lvl="0" indent="0" marL="0">
+              <a:buNone/>
+            </a:pPr>
+            <a:r>
+              <a:rPr/>
+              <a:t>It is often easier to work on the log scale, and maximizing the log partial likelihood is equivalent.</a:t>
+            </a:r>
+          </a:p>
+        </p:txBody>
+      </p:sp>
+      <p:sp>
+        <p:nvSpPr>
+          <p:cNvPr id="4" name="Slide Number Placeholder 3"/>
+          <p:cNvSpPr>
+            <a:spLocks noGrp="1"/>
+          </p:cNvSpPr>
+          <p:nvPr>
+            <p:ph type="sldNum" sz="quarter" idx="10"/>
+          </p:nvPr>
+        </p:nvSpPr>
+        <p:spPr/>
+        <p:txBody>
+          <a:bodyPr/>
+          <a:lstStyle/>
+          <a:p>
+            <a:fld id="{18BDFEC3-8487-43E8-A154-7C12CBC1FFF2}" type="slidenum">
+              <a:rPr lang="en-US"/>
+              <a:t>20</a:t>
+            </a:fld>
+            <a:endParaRPr lang="en-US"/>
+          </a:p>
+        </p:txBody>
+      </p:sp>
+    </p:spTree>
+  </p:cSld>
+</p:notes>
+</file>
+
+<file path=ppt/notesSlides/notesSlide19.xml><?xml version="1.0" encoding="utf-8"?>
+<p:notes xmlns:a="http://schemas.openxmlformats.org/drawingml/2006/main" xmlns:r="http://schemas.openxmlformats.org/officeDocument/2006/relationships" xmlns:p="http://schemas.openxmlformats.org/presentationml/2006/main">
+  <p:cSld>
+    <p:spTree>
+      <p:nvGrpSpPr>
+        <p:cNvPr id="1" name=""/>
+        <p:cNvGrpSpPr/>
+        <p:nvPr/>
+      </p:nvGrpSpPr>
+      <p:grpSpPr>
+        <a:xfrm>
+          <a:off x="0" y="0"/>
+          <a:ext cx="0" cy="0"/>
+          <a:chOff x="0" y="0"/>
+          <a:chExt cx="0" cy="0"/>
+        </a:xfrm>
+      </p:grpSpPr>
+      <p:sp>
+        <p:nvSpPr>
+          <p:cNvPr id="2" name="Slide Image Placeholder 1"/>
+          <p:cNvSpPr>
+            <a:spLocks noGrp="1" noRot="1" noChangeAspect="1"/>
+          </p:cNvSpPr>
+          <p:nvPr>
+            <p:ph type="sldImg"/>
+          </p:nvPr>
+        </p:nvSpPr>
+        <p:spPr/>
+      </p:sp>
+      <p:sp>
+        <p:nvSpPr>
+          <p:cNvPr id="3" name="Notes Placeholder 2"/>
+          <p:cNvSpPr>
+            <a:spLocks noGrp="1"/>
+          </p:cNvSpPr>
+          <p:nvPr>
+            <p:ph type="body" idx="1"/>
+          </p:nvPr>
+        </p:nvSpPr>
+        <p:spPr/>
+        <p:txBody>
+          <a:bodyPr/>
+          <a:lstStyle/>
+          <a:p>
+            <a:pPr lvl="0" indent="0" marL="0">
+              <a:buNone/>
+            </a:pPr>
+            <a:r>
+              <a:rPr/>
+              <a:t>There are three tests that you can use for the Cox regression model. A partial likelihood ratio test compares the highest log partial likelihood (the log partial likelihood at </a:t>
+            </a:r>
+            <a:r>
+              <a:rPr/>
+              <a:t>\hat\beta</a:t>
+            </a:r>
+            <a:r>
+              <a:rPr/>
+              <a:t> to the log partial likelihood at zero.</a:t>
+            </a:r>
+          </a:p>
+          <a:p>
+            <a:pPr lvl="0" indent="0" marL="0">
+              <a:buNone/>
+            </a:pPr>
+          </a:p>
+          <a:p>
+            <a:pPr lvl="0" indent="0" marL="0">
+              <a:buNone/>
+            </a:pPr>
+            <a:r>
+              <a:rPr/>
+              <a:t>The score test looks at the first derivative of the partial likelihood evaluated at zero.</a:t>
+            </a:r>
+          </a:p>
+          <a:p>
+            <a:pPr lvl="0" indent="0" marL="0">
+              <a:buNone/>
+            </a:pPr>
+          </a:p>
+          <a:p>
+            <a:pPr lvl="0" indent="0" marL="0">
+              <a:buNone/>
+            </a:pPr>
+            <a:r>
+              <a:rPr/>
+              <a:t>You can get a standard error for your estimates through the matrix of second partial derivatives of the log partial likelihood.</a:t>
+            </a:r>
+          </a:p>
+          <a:p>
+            <a:pPr lvl="0" indent="0" marL="0">
+              <a:buNone/>
+            </a:pPr>
+          </a:p>
+          <a:p>
+            <a:pPr lvl="0" indent="0" marL="0">
+              <a:buNone/>
+            </a:pPr>
+            <a:r>
+              <a:rPr/>
+              <a:t>The formulas shown here area bit messy, but are very helpful when looking at various properties of the Cox regression model, such as residual analysis.</a:t>
+            </a:r>
+          </a:p>
+        </p:txBody>
+      </p:sp>
+      <p:sp>
+        <p:nvSpPr>
+          <p:cNvPr id="4" name="Slide Number Placeholder 3"/>
+          <p:cNvSpPr>
+            <a:spLocks noGrp="1"/>
+          </p:cNvSpPr>
+          <p:nvPr>
+            <p:ph type="sldNum" sz="quarter" idx="10"/>
+          </p:nvPr>
+        </p:nvSpPr>
+        <p:spPr/>
+        <p:txBody>
+          <a:bodyPr/>
+          <a:lstStyle/>
+          <a:p>
+            <a:fld id="{18BDFEC3-8487-43E8-A154-7C12CBC1FFF2}" type="slidenum">
+              <a:rPr lang="en-US"/>
+              <a:t>21</a:t>
+            </a:fld>
+            <a:endParaRPr lang="en-US"/>
+          </a:p>
+        </p:txBody>
+      </p:sp>
+    </p:spTree>
+  </p:cSld>
+</p:notes>
+</file>
+
 <file path=ppt/notesSlides/notesSlide2.xml><?xml version="1.0" encoding="utf-8"?>
 <p:notes xmlns:a="http://schemas.openxmlformats.org/drawingml/2006/main" xmlns:r="http://schemas.openxmlformats.org/officeDocument/2006/relationships" xmlns:p="http://schemas.openxmlformats.org/presentationml/2006/main">
   <p:cSld>
@@ -1212,7 +2205,21 @@
             </a:pPr>
             <a:r>
               <a:rPr/>
-              <a:t>This paper by Sir David Roxbee Cox introduced the proportional hazards regression model, also known as the Cox regression model. This paper has been cited over 28,000 times and represents the 24th most cited research paper in any field, according to a 2014 publication in Nature.</a:t>
+              <a:t>I found some data on mortality from the Social Security website and plotted an approximation to the probability density function. There is an unusual early peak in this function because the first year of your life is one of the most dangerous ones you will have to face.</a:t>
+            </a:r>
+          </a:p>
+          <a:p>
+            <a:pPr lvl="0" indent="0" marL="0">
+              <a:buNone/>
+            </a:pPr>
+          </a:p>
+          <a:p>
+            <a:pPr lvl="0" indent="0" marL="0">
+              <a:buNone/>
+            </a:pPr>
+            <a:r>
+              <a:rPr/>
+              <a:t>Imagine yourself working in life insurance sales. You want to price your policies so that you only ask for low payments on the policy when the risk of death is low. So let’s calculate some probabilities.</a:t>
             </a:r>
           </a:p>
         </p:txBody>
@@ -1234,7 +2241,7 @@
           <a:p>
             <a:fld id="{18BDFEC3-8487-43E8-A154-7C12CBC1FFF2}" type="slidenum">
               <a:rPr lang="en-US"/>
-              <a:t>18</a:t>
+              <a:t>11</a:t>
             </a:fld>
             <a:endParaRPr lang="en-US"/>
           </a:p>
@@ -4394,6 +5401,36 @@
           </a:p>
         </p:txBody>
       </p:sp>
+      <p:pic>
+        <p:nvPicPr>
+          <p:cNvPr descr="frailty_files/figure-pptx/unnamed-chunk-2-1.png" id="0" name="Picture 1"/>
+          <p:cNvPicPr>
+            <a:picLocks noGrp="1" noChangeAspect="1"/>
+          </p:cNvPicPr>
+          <p:nvPr/>
+        </p:nvPicPr>
+        <p:blipFill>
+          <a:blip r:embed="rId3"/>
+          <a:stretch>
+            <a:fillRect/>
+          </a:stretch>
+        </p:blipFill>
+        <p:spPr bwMode="auto">
+          <a:xfrm>
+            <a:off x="1181100" y="1193800"/>
+            <a:ext cx="6781800" cy="3390900"/>
+          </a:xfrm>
+          <a:prstGeom prst="rect">
+            <a:avLst/>
+          </a:prstGeom>
+          <a:noFill/>
+          <a:ln w="9525">
+            <a:noFill/>
+            <a:headEnd/>
+            <a:tailEnd/>
+          </a:ln>
+        </p:spPr>
+      </p:pic>
     </p:spTree>
   </p:cSld>
 </p:sld>
@@ -4436,21 +5473,21 @@
             </a:pPr>
             <a:r>
               <a:rPr/>
-              <a:t>Probabilities for life insurance</a:t>
+              <a:t>Probabilities for ages 21 through 41</a:t>
             </a:r>
           </a:p>
         </p:txBody>
       </p:sp>
       <p:pic>
         <p:nvPicPr>
-          <p:cNvPr descr="frailty_files/figure-pptx/unnamed-chunk-4-1.png" id="0" name="Picture 1"/>
+          <p:cNvPr descr="frailty_files/figure-pptx/unnamed-chunk-3-1.png" id="0" name="Picture 1"/>
           <p:cNvPicPr>
             <a:picLocks noGrp="1" noChangeAspect="1"/>
           </p:cNvPicPr>
           <p:nvPr/>
         </p:nvPicPr>
         <p:blipFill>
-          <a:blip r:embed="rId2"/>
+          <a:blip r:embed="rId3"/>
           <a:stretch>
             <a:fillRect/>
           </a:stretch>
@@ -4513,21 +5550,21 @@
             </a:pPr>
             <a:r>
               <a:rPr/>
-              <a:t>Probabilities for ages 21 through 41</a:t>
+              <a:t>Probabilities for ages 95 through 99</a:t>
             </a:r>
           </a:p>
         </p:txBody>
       </p:sp>
       <p:pic>
         <p:nvPicPr>
-          <p:cNvPr descr="frailty_files/figure-pptx/unnamed-chunk-6-1.png" id="0" name="Picture 1"/>
+          <p:cNvPr descr="frailty_files/figure-pptx/unnamed-chunk-4-1.png" id="0" name="Picture 1"/>
           <p:cNvPicPr>
             <a:picLocks noGrp="1" noChangeAspect="1"/>
           </p:cNvPicPr>
           <p:nvPr/>
         </p:nvPicPr>
         <p:blipFill>
-          <a:blip r:embed="rId2"/>
+          <a:blip r:embed="rId3"/>
           <a:stretch>
             <a:fillRect/>
           </a:stretch>
@@ -4590,41 +5627,69 @@
             </a:pPr>
             <a:r>
               <a:rPr/>
-              <a:t>Probabilities for ages 95 through 99</a:t>
-            </a:r>
-          </a:p>
-        </p:txBody>
-      </p:sp>
-      <p:pic>
-        <p:nvPicPr>
-          <p:cNvPr descr="frailty_files/figure-pptx/unnamed-chunk-8-1.png" id="0" name="Picture 1"/>
-          <p:cNvPicPr>
-            <a:picLocks noGrp="1" noChangeAspect="1"/>
-          </p:cNvPicPr>
-          <p:nvPr/>
-        </p:nvPicPr>
-        <p:blipFill>
-          <a:blip r:embed="rId2"/>
-          <a:stretch>
-            <a:fillRect/>
-          </a:stretch>
-        </p:blipFill>
-        <p:spPr bwMode="auto">
-          <a:xfrm>
-            <a:off x="1181100" y="1193800"/>
-            <a:ext cx="6781800" cy="3390900"/>
-          </a:xfrm>
-          <a:prstGeom prst="rect">
-            <a:avLst/>
-          </a:prstGeom>
-          <a:noFill/>
-          <a:ln w="9525">
-            <a:noFill/>
-            <a:headEnd/>
-            <a:tailEnd/>
-          </a:ln>
-        </p:spPr>
-      </p:pic>
+              <a:t>Why are these probabilities not comparable?</a:t>
+            </a:r>
+          </a:p>
+        </p:txBody>
+      </p:sp>
+      <p:sp>
+        <p:nvSpPr>
+          <p:cNvPr id="3" name="Content Placeholder 2"/>
+          <p:cNvSpPr>
+            <a:spLocks noGrp="1"/>
+          </p:cNvSpPr>
+          <p:nvPr>
+            <p:ph idx="1"/>
+          </p:nvPr>
+        </p:nvSpPr>
+        <p:spPr/>
+        <p:txBody>
+          <a:bodyPr/>
+          <a:lstStyle/>
+          <a:p>
+            <a:pPr lvl="0"/>
+            <a:r>
+              <a:rPr/>
+              <a:t>Unequal time intervals</a:t>
+            </a:r>
+          </a:p>
+          <a:p>
+            <a:pPr lvl="1"/>
+            <a:r>
+              <a:rPr/>
+              <a:t>Fix by computing a rate</a:t>
+            </a:r>
+          </a:p>
+          <a:p>
+            <a:pPr lvl="0"/>
+            <a:r>
+              <a:rPr/>
+              <a:t>Non-uniform probabilities over the interval</a:t>
+            </a:r>
+          </a:p>
+          <a:p>
+            <a:pPr lvl="1"/>
+            <a:r>
+              <a:rPr/>
+              <a:t>Fix by looking at narrow interval</a:t>
+            </a:r>
+          </a:p>
+          <a:p>
+            <a:pPr lvl="0"/>
+            <a:r>
+              <a:rPr/>
+              <a:t>No adjustment for survivorship</a:t>
+            </a:r>
+          </a:p>
+          <a:p>
+            <a:pPr lvl="1"/>
+            <a:r>
+              <a:rPr/>
+              <a:t>Fix by dividing by survival probabilty</a:t>
+            </a:r>
+          </a:p>
+        </p:txBody>
+      </p:sp>
     </p:spTree>
   </p:cSld>
 </p:sld>
@@ -4689,9 +5754,7 @@
               <a:bodyPr/>
               <a:lstStyle/>
               <a:p>
-                <a:pPr lvl="0" indent="0" marL="0">
-                  <a:buNone/>
-                </a:pPr>
+                <a:pPr lvl="0"/>
                 <a14:m>
                   <m:oMathPara xmlns:m="http://schemas.openxmlformats.org/officeDocument/2006/math">
                     <m:oMathParaPr>
@@ -4847,21 +5910,7 @@
                 </a14:m>
               </a:p>
               <a:p>
-                <a:pPr lvl="0" indent="0" marL="0">
-                  <a:buNone/>
-                </a:pPr>
-                <a14:m>
-                  <m:oMath xmlns:m="http://schemas.openxmlformats.org/officeDocument/2006/math">
-                    <m:r>
-                      <m:t> </m:t>
-                    </m:r>
-                  </m:oMath>
-                </a14:m>
-              </a:p>
-              <a:p>
-                <a:pPr lvl="0" indent="0" marL="0">
-                  <a:buNone/>
-                </a:pPr>
+                <a:pPr lvl="0"/>
                 <a14:m>
                   <m:oMathPara xmlns:m="http://schemas.openxmlformats.org/officeDocument/2006/math">
                     <m:oMathParaPr>
@@ -4936,19 +5985,7 @@
                 </a14:m>
               </a:p>
               <a:p>
-                <a:pPr lvl="0" indent="0" marL="0">
-                  <a:buNone/>
-                </a:pPr>
-                <a14:m>
-                  <m:oMath xmlns:m="http://schemas.openxmlformats.org/officeDocument/2006/math">
-                    <m:r>
-                      <m:t> </m:t>
-                    </m:r>
-                  </m:oMath>
-                </a14:m>
-              </a:p>
-              <a:p>
-                <a:pPr lvl="0"/>
+                <a:pPr lvl="1"/>
                 <a:r>
                   <a:rPr/>
                   <a:t>where </a:t>
@@ -4966,7 +6003,7 @@
                 </a:r>
               </a:p>
               <a:p>
-                <a:pPr lvl="0"/>
+                <a:pPr lvl="1"/>
                 <a14:m>
                   <m:oMath xmlns:m="http://schemas.openxmlformats.org/officeDocument/2006/math">
                     <m:r>
@@ -5087,14 +6124,14 @@
       </p:sp>
       <p:pic>
         <p:nvPicPr>
-          <p:cNvPr descr="frailty_files/figure-pptx/unnamed-chunk-10-1.png" id="0" name="Picture 1"/>
+          <p:cNvPr descr="frailty_files/figure-pptx/unnamed-chunk-5-1.png" id="0" name="Picture 1"/>
           <p:cNvPicPr>
             <a:picLocks noGrp="1" noChangeAspect="1"/>
           </p:cNvPicPr>
           <p:nvPr/>
         </p:nvPicPr>
         <p:blipFill>
-          <a:blip r:embed="rId2"/>
+          <a:blip r:embed="rId3"/>
           <a:stretch>
             <a:fillRect/>
           </a:stretch>
@@ -5164,14 +6201,14 @@
       </p:sp>
       <p:pic>
         <p:nvPicPr>
-          <p:cNvPr descr="frailty_files/figure-pptx/unnamed-chunk-12-1.png" id="0" name="Picture 1"/>
+          <p:cNvPr descr="frailty_files/figure-pptx/unnamed-chunk-6-1.png" id="0" name="Picture 1"/>
           <p:cNvPicPr>
             <a:picLocks noGrp="1" noChangeAspect="1"/>
           </p:cNvPicPr>
           <p:nvPr/>
         </p:nvPicPr>
         <p:blipFill>
-          <a:blip r:embed="rId2"/>
+          <a:blip r:embed="rId3"/>
           <a:stretch>
             <a:fillRect/>
           </a:stretch>
@@ -5234,7 +6271,7 @@
             </a:pPr>
             <a:r>
               <a:rPr/>
-              <a:t>Cox regression model, 1 of 2</a:t>
+              <a:t>Cox publication</a:t>
             </a:r>
           </a:p>
         </p:txBody>
@@ -5311,7 +6348,7 @@
             </a:pPr>
             <a:r>
               <a:rPr/>
-              <a:t>Cox regression model, 2 of 2</a:t>
+              <a:t>The Cox regression model</a:t>
             </a:r>
           </a:p>
         </p:txBody>
@@ -5333,9 +6370,7 @@
               <a:bodyPr/>
               <a:lstStyle/>
               <a:p>
-                <a:pPr lvl="0" indent="0" marL="0">
-                  <a:buNone/>
-                </a:pPr>
+                <a:pPr lvl="0"/>
                 <a14:m>
                   <m:oMath xmlns:m="http://schemas.openxmlformats.org/officeDocument/2006/math">
                     <m:r>
@@ -5387,13 +6422,23 @@
                       </m:rPr>
                       <m:t>=</m:t>
                     </m:r>
-                    <m:sSup>
+                    <m:r>
+                      <m:t>e</m:t>
+                    </m:r>
+                    <m:r>
+                      <m:t>x</m:t>
+                    </m:r>
+                    <m:r>
+                      <m:t>p</m:t>
+                    </m:r>
+                    <m:d>
+                      <m:dPr>
+                        <m:begChr m:val="("/>
+                        <m:endChr m:val=")"/>
+                        <m:sepChr m:val=""/>
+                        <m:grow/>
+                      </m:dPr>
                       <m:e>
-                        <m:r>
-                          <m:t>e</m:t>
-                        </m:r>
-                      </m:e>
-                      <m:sup>
                         <m:sSub>
                           <m:e>
                             <m:r>
@@ -5409,8 +6454,8 @@
                         <m:r>
                           <m:t>β</m:t>
                         </m:r>
-                      </m:sup>
-                    </m:sSup>
+                      </m:e>
+                    </m:d>
                     <m:sSub>
                       <m:e>
                         <m:r>
@@ -5440,21 +6485,14 @@
                 </a14:m>
               </a:p>
               <a:p>
-                <a:pPr lvl="0" indent="0" marL="0">
-                  <a:buNone/>
-                </a:pPr>
-                <a14:m>
-                  <m:oMath xmlns:m="http://schemas.openxmlformats.org/officeDocument/2006/math">
-                    <m:r>
-                      <m:t> </m:t>
-                    </m:r>
-                  </m:oMath>
-                </a14:m>
+                <a:pPr lvl="1"/>
+                <a:r>
+                  <a:rPr/>
+                  <a:t>The meaning of proportional hazards</a:t>
+                </a:r>
               </a:p>
               <a:p>
-                <a:pPr lvl="0" indent="0" marL="0">
-                  <a:buNone/>
-                </a:pPr>
+                <a:pPr lvl="2"/>
                 <a14:m>
                   <m:oMath xmlns:m="http://schemas.openxmlformats.org/officeDocument/2006/math">
                     <m:f>
@@ -5553,7 +6591,7 @@
                               </m:e>
                               <m:sub>
                                 <m:r>
-                                  <m:t>i</m:t>
+                                  <m:t>j</m:t>
                                 </m:r>
                               </m:sub>
                             </m:sSub>
@@ -5576,58 +6614,58 @@
                       </m:rPr>
                       <m:t>=</m:t>
                     </m:r>
-                    <m:sSup>
+                    <m:r>
+                      <m:t>e</m:t>
+                    </m:r>
+                    <m:r>
+                      <m:t>x</m:t>
+                    </m:r>
+                    <m:r>
+                      <m:t>p</m:t>
+                    </m:r>
+                    <m:d>
+                      <m:dPr>
+                        <m:begChr m:val="("/>
+                        <m:endChr m:val=")"/>
+                        <m:sepChr m:val=""/>
+                        <m:grow/>
+                      </m:dPr>
                       <m:e>
+                        <m:sSub>
+                          <m:e>
+                            <m:r>
+                              <m:t>X</m:t>
+                            </m:r>
+                          </m:e>
+                          <m:sub>
+                            <m:r>
+                              <m:t>i</m:t>
+                            </m:r>
+                          </m:sub>
+                        </m:sSub>
                         <m:r>
-                          <m:t>e</m:t>
+                          <m:rPr>
+                            <m:sty m:val="p"/>
+                          </m:rPr>
+                          <m:t>−</m:t>
                         </m:r>
+                        <m:sSub>
+                          <m:e>
+                            <m:r>
+                              <m:t>X</m:t>
+                            </m:r>
+                          </m:e>
+                          <m:sub>
+                            <m:r>
+                              <m:t>j</m:t>
+                            </m:r>
+                          </m:sub>
+                        </m:sSub>
                       </m:e>
-                      <m:sup>
-                        <m:d>
-                          <m:dPr>
-                            <m:begChr m:val="("/>
-                            <m:endChr m:val=")"/>
-                            <m:sepChr m:val=""/>
-                            <m:grow/>
-                          </m:dPr>
-                          <m:e>
-                            <m:sSub>
-                              <m:e>
-                                <m:r>
-                                  <m:t>X</m:t>
-                                </m:r>
-                              </m:e>
-                              <m:sub>
-                                <m:r>
-                                  <m:t>i</m:t>
-                                </m:r>
-                              </m:sub>
-                            </m:sSub>
-                            <m:r>
-                              <m:rPr>
-                                <m:sty m:val="p"/>
-                              </m:rPr>
-                              <m:t>−</m:t>
-                            </m:r>
-                            <m:sSub>
-                              <m:e>
-                                <m:r>
-                                  <m:t>X</m:t>
-                                </m:r>
-                              </m:e>
-                              <m:sub>
-                                <m:r>
-                                  <m:t>j</m:t>
-                                </m:r>
-                              </m:sub>
-                            </m:sSub>
-                          </m:e>
-                        </m:d>
-                        <m:r>
-                          <m:t>β</m:t>
-                        </m:r>
-                      </m:sup>
-                    </m:sSup>
+                    </m:d>
+                    <m:r>
+                      <m:t>β</m:t>
+                    </m:r>
                   </m:oMath>
                 </a14:m>
               </a:p>
@@ -5717,6 +6755,1253 @@
           </a:p>
         </p:txBody>
       </p:sp>
+    </p:spTree>
+  </p:cSld>
+</p:sld>
+</file>
+
+<file path=ppt/slides/slide20.xml><?xml version="1.0" encoding="utf-8"?>
+<p:sld xmlns:a="http://schemas.openxmlformats.org/drawingml/2006/main" xmlns:r="http://schemas.openxmlformats.org/officeDocument/2006/relationships" xmlns:p="http://schemas.openxmlformats.org/presentationml/2006/main">
+  <p:cSld>
+    <p:spTree>
+      <p:nvGrpSpPr>
+        <p:cNvPr id="1" name=""/>
+        <p:cNvGrpSpPr/>
+        <p:nvPr/>
+      </p:nvGrpSpPr>
+      <p:grpSpPr>
+        <a:xfrm>
+          <a:off x="0" y="0"/>
+          <a:ext cx="0" cy="0"/>
+          <a:chOff x="0" y="0"/>
+          <a:chExt cx="0" cy="0"/>
+        </a:xfrm>
+      </p:grpSpPr>
+      <p:sp>
+        <p:nvSpPr>
+          <p:cNvPr id="2" name="Title 1"/>
+          <p:cNvSpPr>
+            <a:spLocks noGrp="1"/>
+          </p:cNvSpPr>
+          <p:nvPr>
+            <p:ph type="title"/>
+          </p:nvPr>
+        </p:nvSpPr>
+        <p:spPr/>
+        <p:txBody>
+          <a:bodyPr/>
+          <a:lstStyle/>
+          <a:p>
+            <a:pPr lvl="0" indent="0" marL="0">
+              <a:buNone/>
+            </a:pPr>
+            <a:r>
+              <a:rPr/>
+              <a:t>Estimation in the Cox model</a:t>
+            </a:r>
+          </a:p>
+        </p:txBody>
+      </p:sp>
+      <mc:AlternateContent xmlns:mc="http://schemas.openxmlformats.org/markup-compatibility/2006">
+        <mc:Choice xmlns:a14="http://schemas.microsoft.com/office/drawing/2010/main" Requires="a14">
+          <p:sp>
+            <p:nvSpPr>
+              <p:cNvPr id="3" name="Content Placeholder 2"/>
+              <p:cNvSpPr>
+                <a:spLocks noGrp="1"/>
+              </p:cNvSpPr>
+              <p:nvPr>
+                <p:ph idx="1"/>
+              </p:nvPr>
+            </p:nvSpPr>
+            <p:spPr/>
+            <p:txBody>
+              <a:bodyPr/>
+              <a:lstStyle/>
+              <a:p>
+                <a:pPr lvl="0"/>
+                <a:r>
+                  <a:rPr/>
+                  <a:t>Partial likelihood</a:t>
+                </a:r>
+              </a:p>
+              <a:p>
+                <a:pPr lvl="1"/>
+                <a14:m>
+                  <m:oMath xmlns:m="http://schemas.openxmlformats.org/officeDocument/2006/math">
+                    <m:sSub>
+                      <m:e>
+                        <m:r>
+                          <m:rPr>
+                            <m:sty m:val="p"/>
+                            <m:scr m:val="script"/>
+                          </m:rPr>
+                          <m:t>l</m:t>
+                        </m:r>
+                      </m:e>
+                      <m:sub>
+                        <m:r>
+                          <m:t>p</m:t>
+                        </m:r>
+                      </m:sub>
+                    </m:sSub>
+                    <m:d>
+                      <m:dPr>
+                        <m:begChr m:val="("/>
+                        <m:endChr m:val=")"/>
+                        <m:sepChr m:val=""/>
+                        <m:grow/>
+                      </m:dPr>
+                      <m:e>
+                        <m:r>
+                          <m:t>β</m:t>
+                        </m:r>
+                      </m:e>
+                    </m:d>
+                    <m:r>
+                      <m:rPr>
+                        <m:sty m:val="p"/>
+                      </m:rPr>
+                      <m:t>=</m:t>
+                    </m:r>
+                    <m:sSub>
+                      <m:e>
+                        <m:r>
+                          <m:t>Π</m:t>
+                        </m:r>
+                      </m:e>
+                      <m:sub>
+                        <m:r>
+                          <m:t>i</m:t>
+                        </m:r>
+                      </m:sub>
+                    </m:sSub>
+                    <m:f>
+                      <m:fPr>
+                        <m:type m:val="bar"/>
+                      </m:fPr>
+                      <m:num>
+                        <m:r>
+                          <m:t>e</m:t>
+                        </m:r>
+                        <m:r>
+                          <m:t>x</m:t>
+                        </m:r>
+                        <m:r>
+                          <m:t>p</m:t>
+                        </m:r>
+                        <m:d>
+                          <m:dPr>
+                            <m:begChr m:val="("/>
+                            <m:endChr m:val=")"/>
+                            <m:sepChr m:val=""/>
+                            <m:grow/>
+                          </m:dPr>
+                          <m:e>
+                            <m:sSub>
+                              <m:e>
+                                <m:r>
+                                  <m:t>X</m:t>
+                                </m:r>
+                              </m:e>
+                              <m:sub>
+                                <m:r>
+                                  <m:t>i</m:t>
+                                </m:r>
+                              </m:sub>
+                            </m:sSub>
+                            <m:r>
+                              <m:t>β</m:t>
+                            </m:r>
+                          </m:e>
+                        </m:d>
+                      </m:num>
+                      <m:den>
+                        <m:sSub>
+                          <m:e>
+                            <m:r>
+                              <m:t>Σ</m:t>
+                            </m:r>
+                          </m:e>
+                          <m:sub>
+                            <m:r>
+                              <m:t>j</m:t>
+                            </m:r>
+                            <m:r>
+                              <m:rPr>
+                                <m:sty m:val="p"/>
+                              </m:rPr>
+                              <m:t>∈</m:t>
+                            </m:r>
+                            <m:sSub>
+                              <m:e>
+                                <m:r>
+                                  <m:t>R</m:t>
+                                </m:r>
+                              </m:e>
+                              <m:sub>
+                                <m:r>
+                                  <m:t>i</m:t>
+                                </m:r>
+                              </m:sub>
+                            </m:sSub>
+                          </m:sub>
+                        </m:sSub>
+                        <m:r>
+                          <m:t>e</m:t>
+                        </m:r>
+                        <m:r>
+                          <m:t>x</m:t>
+                        </m:r>
+                        <m:r>
+                          <m:t>p</m:t>
+                        </m:r>
+                        <m:d>
+                          <m:dPr>
+                            <m:begChr m:val="("/>
+                            <m:endChr m:val=")"/>
+                            <m:sepChr m:val=""/>
+                            <m:grow/>
+                          </m:dPr>
+                          <m:e>
+                            <m:sSub>
+                              <m:e>
+                                <m:r>
+                                  <m:t>X</m:t>
+                                </m:r>
+                              </m:e>
+                              <m:sub>
+                                <m:r>
+                                  <m:t>j</m:t>
+                                </m:r>
+                              </m:sub>
+                            </m:sSub>
+                            <m:r>
+                              <m:t>β</m:t>
+                            </m:r>
+                          </m:e>
+                        </m:d>
+                      </m:den>
+                    </m:f>
+                  </m:oMath>
+                </a14:m>
+              </a:p>
+              <a:p>
+                <a:pPr lvl="2"/>
+                <a:r>
+                  <a:rPr/>
+                  <a:t>R is all patients in the risk set</a:t>
+                </a:r>
+              </a:p>
+              <a:p>
+                <a:pPr lvl="0"/>
+                <a:r>
+                  <a:rPr/>
+                  <a:t>Log partial likelihood</a:t>
+                </a:r>
+              </a:p>
+              <a:p>
+                <a:pPr lvl="1"/>
+                <a14:m>
+                  <m:oMath xmlns:m="http://schemas.openxmlformats.org/officeDocument/2006/math">
+                    <m:sSub>
+                      <m:e>
+                        <m:r>
+                          <m:rPr>
+                            <m:sty m:val="p"/>
+                            <m:scr m:val="script"/>
+                          </m:rPr>
+                          <m:t>L</m:t>
+                        </m:r>
+                      </m:e>
+                      <m:sub>
+                        <m:r>
+                          <m:t>p</m:t>
+                        </m:r>
+                      </m:sub>
+                    </m:sSub>
+                    <m:d>
+                      <m:dPr>
+                        <m:begChr m:val="("/>
+                        <m:endChr m:val=")"/>
+                        <m:sepChr m:val=""/>
+                        <m:grow/>
+                      </m:dPr>
+                      <m:e>
+                        <m:r>
+                          <m:t>β</m:t>
+                        </m:r>
+                      </m:e>
+                    </m:d>
+                    <m:r>
+                      <m:rPr>
+                        <m:sty m:val="p"/>
+                      </m:rPr>
+                      <m:t>=</m:t>
+                    </m:r>
+                    <m:sSub>
+                      <m:e>
+                        <m:r>
+                          <m:t>Π</m:t>
+                        </m:r>
+                      </m:e>
+                      <m:sub>
+                        <m:r>
+                          <m:t>i</m:t>
+                        </m:r>
+                      </m:sub>
+                    </m:sSub>
+                    <m:d>
+                      <m:dPr>
+                        <m:begChr m:val="("/>
+                        <m:endChr m:val=")"/>
+                        <m:sepChr m:val=""/>
+                        <m:grow/>
+                      </m:dPr>
+                      <m:e>
+                        <m:sSub>
+                          <m:e>
+                            <m:r>
+                              <m:t>X</m:t>
+                            </m:r>
+                          </m:e>
+                          <m:sub>
+                            <m:r>
+                              <m:t>i</m:t>
+                            </m:r>
+                          </m:sub>
+                        </m:sSub>
+                        <m:r>
+                          <m:t>β</m:t>
+                        </m:r>
+                        <m:r>
+                          <m:rPr>
+                            <m:sty m:val="p"/>
+                          </m:rPr>
+                          <m:t>−</m:t>
+                        </m:r>
+                        <m:r>
+                          <m:t>l</m:t>
+                        </m:r>
+                        <m:r>
+                          <m:t>n</m:t>
+                        </m:r>
+                        <m:d>
+                          <m:dPr>
+                            <m:begChr m:val="("/>
+                            <m:endChr m:val=")"/>
+                            <m:sepChr m:val=""/>
+                            <m:grow/>
+                          </m:dPr>
+                          <m:e>
+                            <m:sSub>
+                              <m:e>
+                                <m:r>
+                                  <m:t>Σ</m:t>
+                                </m:r>
+                              </m:e>
+                              <m:sub>
+                                <m:r>
+                                  <m:t>j</m:t>
+                                </m:r>
+                                <m:r>
+                                  <m:rPr>
+                                    <m:sty m:val="p"/>
+                                  </m:rPr>
+                                  <m:t>∈</m:t>
+                                </m:r>
+                                <m:sSub>
+                                  <m:e>
+                                    <m:r>
+                                      <m:t>R</m:t>
+                                    </m:r>
+                                  </m:e>
+                                  <m:sub>
+                                    <m:r>
+                                      <m:t>i</m:t>
+                                    </m:r>
+                                  </m:sub>
+                                </m:sSub>
+                              </m:sub>
+                            </m:sSub>
+                            <m:r>
+                              <m:t>e</m:t>
+                            </m:r>
+                            <m:r>
+                              <m:t>x</m:t>
+                            </m:r>
+                            <m:r>
+                              <m:t>p</m:t>
+                            </m:r>
+                            <m:d>
+                              <m:dPr>
+                                <m:begChr m:val="("/>
+                                <m:endChr m:val=")"/>
+                                <m:sepChr m:val=""/>
+                                <m:grow/>
+                              </m:dPr>
+                              <m:e>
+                                <m:sSub>
+                                  <m:e>
+                                    <m:r>
+                                      <m:t>X</m:t>
+                                    </m:r>
+                                  </m:e>
+                                  <m:sub>
+                                    <m:r>
+                                      <m:t>j</m:t>
+                                    </m:r>
+                                  </m:sub>
+                                </m:sSub>
+                                <m:r>
+                                  <m:t>β</m:t>
+                                </m:r>
+                              </m:e>
+                            </m:d>
+                          </m:e>
+                        </m:d>
+                      </m:e>
+                    </m:d>
+                  </m:oMath>
+                </a14:m>
+              </a:p>
+              <a:p>
+                <a:pPr lvl="0"/>
+                <a14:m>
+                  <m:oMath xmlns:m="http://schemas.openxmlformats.org/officeDocument/2006/math">
+                    <m:acc>
+                      <m:accPr>
+                        <m:chr m:val="̂"/>
+                      </m:accPr>
+                      <m:e>
+                        <m:r>
+                          <m:t>β</m:t>
+                        </m:r>
+                      </m:e>
+                    </m:acc>
+                  </m:oMath>
+                </a14:m>
+                <a:r>
+                  <a:rPr/>
+                  <a:t> is the value that maximizes </a:t>
+                </a:r>
+                <a14:m>
+                  <m:oMath xmlns:m="http://schemas.openxmlformats.org/officeDocument/2006/math">
+                    <m:sSub>
+                      <m:e>
+                        <m:r>
+                          <m:rPr>
+                            <m:sty m:val="p"/>
+                            <m:scr m:val="script"/>
+                          </m:rPr>
+                          <m:t>L</m:t>
+                        </m:r>
+                      </m:e>
+                      <m:sub>
+                        <m:r>
+                          <m:t>p</m:t>
+                        </m:r>
+                      </m:sub>
+                    </m:sSub>
+                    <m:d>
+                      <m:dPr>
+                        <m:begChr m:val="("/>
+                        <m:endChr m:val=")"/>
+                        <m:sepChr m:val=""/>
+                        <m:grow/>
+                      </m:dPr>
+                      <m:e>
+                        <m:r>
+                          <m:t>β</m:t>
+                        </m:r>
+                      </m:e>
+                    </m:d>
+                  </m:oMath>
+                </a14:m>
+              </a:p>
+            </p:txBody>
+          </p:sp>
+        </mc:Choice>
+      </mc:AlternateContent>
+    </p:spTree>
+  </p:cSld>
+</p:sld>
+</file>
+
+<file path=ppt/slides/slide21.xml><?xml version="1.0" encoding="utf-8"?>
+<p:sld xmlns:a="http://schemas.openxmlformats.org/drawingml/2006/main" xmlns:r="http://schemas.openxmlformats.org/officeDocument/2006/relationships" xmlns:p="http://schemas.openxmlformats.org/presentationml/2006/main">
+  <p:cSld>
+    <p:spTree>
+      <p:nvGrpSpPr>
+        <p:cNvPr id="1" name=""/>
+        <p:cNvGrpSpPr/>
+        <p:nvPr/>
+      </p:nvGrpSpPr>
+      <p:grpSpPr>
+        <a:xfrm>
+          <a:off x="0" y="0"/>
+          <a:ext cx="0" cy="0"/>
+          <a:chOff x="0" y="0"/>
+          <a:chExt cx="0" cy="0"/>
+        </a:xfrm>
+      </p:grpSpPr>
+      <p:sp>
+        <p:nvSpPr>
+          <p:cNvPr id="2" name="Title 1"/>
+          <p:cNvSpPr>
+            <a:spLocks noGrp="1"/>
+          </p:cNvSpPr>
+          <p:nvPr>
+            <p:ph type="title"/>
+          </p:nvPr>
+        </p:nvSpPr>
+        <p:spPr/>
+        <p:txBody>
+          <a:bodyPr/>
+          <a:lstStyle/>
+          <a:p>
+            <a:pPr lvl="0" indent="0" marL="0">
+              <a:buNone/>
+            </a:pPr>
+            <a:r>
+              <a:rPr/>
+              <a:t>Testing in the Cox model</a:t>
+            </a:r>
+          </a:p>
+        </p:txBody>
+      </p:sp>
+      <mc:AlternateContent xmlns:mc="http://schemas.openxmlformats.org/markup-compatibility/2006">
+        <mc:Choice xmlns:a14="http://schemas.microsoft.com/office/drawing/2010/main" Requires="a14">
+          <p:sp>
+            <p:nvSpPr>
+              <p:cNvPr id="3" name="Content Placeholder 2"/>
+              <p:cNvSpPr>
+                <a:spLocks noGrp="1"/>
+              </p:cNvSpPr>
+              <p:nvPr>
+                <p:ph idx="1"/>
+              </p:nvPr>
+            </p:nvSpPr>
+            <p:spPr/>
+            <p:txBody>
+              <a:bodyPr/>
+              <a:lstStyle/>
+              <a:p>
+                <a:pPr lvl="0"/>
+                <a:r>
+                  <a:rPr/>
+                  <a:t>Likelihood ratio test</a:t>
+                </a:r>
+              </a:p>
+              <a:p>
+                <a:pPr lvl="1"/>
+                <a14:m>
+                  <m:oMath xmlns:m="http://schemas.openxmlformats.org/officeDocument/2006/math">
+                    <m:r>
+                      <m:t>2</m:t>
+                    </m:r>
+                    <m:d>
+                      <m:dPr>
+                        <m:begChr m:val="("/>
+                        <m:endChr m:val=")"/>
+                        <m:sepChr m:val=""/>
+                        <m:grow/>
+                      </m:dPr>
+                      <m:e>
+                        <m:sSub>
+                          <m:e>
+                            <m:r>
+                              <m:rPr>
+                                <m:sty m:val="p"/>
+                                <m:scr m:val="script"/>
+                              </m:rPr>
+                              <m:t>L</m:t>
+                            </m:r>
+                          </m:e>
+                          <m:sub>
+                            <m:r>
+                              <m:t>p</m:t>
+                            </m:r>
+                          </m:sub>
+                        </m:sSub>
+                        <m:d>
+                          <m:dPr>
+                            <m:begChr m:val="("/>
+                            <m:endChr m:val=")"/>
+                            <m:sepChr m:val=""/>
+                            <m:grow/>
+                          </m:dPr>
+                          <m:e>
+                            <m:acc>
+                              <m:accPr>
+                                <m:chr m:val="̂"/>
+                              </m:accPr>
+                              <m:e>
+                                <m:r>
+                                  <m:t>β</m:t>
+                                </m:r>
+                              </m:e>
+                            </m:acc>
+                          </m:e>
+                        </m:d>
+                        <m:r>
+                          <m:rPr>
+                            <m:sty m:val="p"/>
+                          </m:rPr>
+                          <m:t>−</m:t>
+                        </m:r>
+                        <m:sSub>
+                          <m:e>
+                            <m:r>
+                              <m:rPr>
+                                <m:sty m:val="p"/>
+                                <m:scr m:val="script"/>
+                              </m:rPr>
+                              <m:t>L</m:t>
+                            </m:r>
+                          </m:e>
+                          <m:sub>
+                            <m:r>
+                              <m:t>p</m:t>
+                            </m:r>
+                          </m:sub>
+                        </m:sSub>
+                        <m:d>
+                          <m:dPr>
+                            <m:begChr m:val="("/>
+                            <m:endChr m:val=")"/>
+                            <m:sepChr m:val=""/>
+                            <m:grow/>
+                          </m:dPr>
+                          <m:e>
+                            <m:r>
+                              <m:t>0</m:t>
+                            </m:r>
+                          </m:e>
+                        </m:d>
+                      </m:e>
+                    </m:d>
+                  </m:oMath>
+                </a14:m>
+              </a:p>
+              <a:p>
+                <a:pPr lvl="0"/>
+                <a:r>
+                  <a:rPr/>
+                  <a:t>Score test</a:t>
+                </a:r>
+              </a:p>
+              <a:p>
+                <a:pPr lvl="1"/>
+                <a14:m>
+                  <m:oMath xmlns:m="http://schemas.openxmlformats.org/officeDocument/2006/math">
+                    <m:f>
+                      <m:fPr>
+                        <m:type m:val="bar"/>
+                      </m:fPr>
+                      <m:num>
+                        <m:r>
+                          <m:rPr>
+                            <m:sty m:val="p"/>
+                          </m:rPr>
+                          <m:t>∂</m:t>
+                        </m:r>
+                      </m:num>
+                      <m:den>
+                        <m:r>
+                          <m:rPr>
+                            <m:sty m:val="p"/>
+                          </m:rPr>
+                          <m:t>∂</m:t>
+                        </m:r>
+                        <m:sSub>
+                          <m:e>
+                            <m:r>
+                              <m:t>β</m:t>
+                            </m:r>
+                          </m:e>
+                          <m:sub>
+                            <m:r>
+                              <m:t>j</m:t>
+                            </m:r>
+                          </m:sub>
+                        </m:sSub>
+                      </m:den>
+                    </m:f>
+                    <m:sSub>
+                      <m:e>
+                        <m:r>
+                          <m:rPr>
+                            <m:sty m:val="p"/>
+                            <m:scr m:val="script"/>
+                          </m:rPr>
+                          <m:t>L</m:t>
+                        </m:r>
+                      </m:e>
+                      <m:sub>
+                        <m:r>
+                          <m:t>p</m:t>
+                        </m:r>
+                      </m:sub>
+                    </m:sSub>
+                    <m:d>
+                      <m:dPr>
+                        <m:begChr m:val="("/>
+                        <m:endChr m:val=")"/>
+                        <m:sepChr m:val=""/>
+                        <m:grow/>
+                      </m:dPr>
+                      <m:e>
+                        <m:r>
+                          <m:t>0</m:t>
+                        </m:r>
+                      </m:e>
+                    </m:d>
+                  </m:oMath>
+                </a14:m>
+              </a:p>
+              <a:p>
+                <a:pPr lvl="0"/>
+                <a:r>
+                  <a:rPr/>
+                  <a:t>Wald test</a:t>
+                </a:r>
+              </a:p>
+              <a:p>
+                <a:pPr lvl="1"/>
+                <a14:m>
+                  <m:oMath xmlns:m="http://schemas.openxmlformats.org/officeDocument/2006/math">
+                    <m:r>
+                      <m:t>I</m:t>
+                    </m:r>
+                    <m:d>
+                      <m:dPr>
+                        <m:begChr m:val="("/>
+                        <m:endChr m:val=")"/>
+                        <m:sepChr m:val=""/>
+                        <m:grow/>
+                      </m:dPr>
+                      <m:e>
+                        <m:r>
+                          <m:t>β</m:t>
+                        </m:r>
+                      </m:e>
+                    </m:d>
+                    <m:r>
+                      <m:rPr>
+                        <m:sty m:val="p"/>
+                      </m:rPr>
+                      <m:t>=</m:t>
+                    </m:r>
+                    <m:r>
+                      <m:rPr>
+                        <m:sty m:val="p"/>
+                      </m:rPr>
+                      <m:t>−</m:t>
+                    </m:r>
+                    <m:f>
+                      <m:fPr>
+                        <m:type m:val="bar"/>
+                      </m:fPr>
+                      <m:num>
+                        <m:sSup>
+                          <m:e>
+                            <m:r>
+                              <m:rPr>
+                                <m:sty m:val="p"/>
+                              </m:rPr>
+                              <m:t>∂</m:t>
+                            </m:r>
+                          </m:e>
+                          <m:sup>
+                            <m:r>
+                              <m:t>2</m:t>
+                            </m:r>
+                          </m:sup>
+                        </m:sSup>
+                      </m:num>
+                      <m:den>
+                        <m:r>
+                          <m:rPr>
+                            <m:sty m:val="p"/>
+                          </m:rPr>
+                          <m:t>∂</m:t>
+                        </m:r>
+                        <m:sSup>
+                          <m:e>
+                            <m:r>
+                              <m:t>β</m:t>
+                            </m:r>
+                          </m:e>
+                          <m:sup>
+                            <m:r>
+                              <m:t>2</m:t>
+                            </m:r>
+                          </m:sup>
+                        </m:sSup>
+                      </m:den>
+                    </m:f>
+                    <m:sSub>
+                      <m:e>
+                        <m:r>
+                          <m:rPr>
+                            <m:sty m:val="p"/>
+                            <m:scr m:val="script"/>
+                          </m:rPr>
+                          <m:t>L</m:t>
+                        </m:r>
+                      </m:e>
+                      <m:sub>
+                        <m:r>
+                          <m:t>p</m:t>
+                        </m:r>
+                      </m:sub>
+                    </m:sSub>
+                    <m:d>
+                      <m:dPr>
+                        <m:begChr m:val="("/>
+                        <m:endChr m:val=")"/>
+                        <m:sepChr m:val=""/>
+                        <m:grow/>
+                      </m:dPr>
+                      <m:e>
+                        <m:r>
+                          <m:t>β</m:t>
+                        </m:r>
+                      </m:e>
+                    </m:d>
+                  </m:oMath>
+                </a14:m>
+              </a:p>
+              <a:p>
+                <a:pPr lvl="1"/>
+                <a14:m>
+                  <m:oMath xmlns:m="http://schemas.openxmlformats.org/officeDocument/2006/math">
+                    <m:r>
+                      <m:t>s</m:t>
+                    </m:r>
+                    <m:r>
+                      <m:t>e</m:t>
+                    </m:r>
+                    <m:d>
+                      <m:dPr>
+                        <m:begChr m:val="("/>
+                        <m:endChr m:val=")"/>
+                        <m:sepChr m:val=""/>
+                        <m:grow/>
+                      </m:dPr>
+                      <m:e>
+                        <m:acc>
+                          <m:accPr>
+                            <m:chr m:val="̂"/>
+                          </m:accPr>
+                          <m:e>
+                            <m:r>
+                              <m:t>β</m:t>
+                            </m:r>
+                          </m:e>
+                        </m:acc>
+                      </m:e>
+                    </m:d>
+                    <m:r>
+                      <m:rPr>
+                        <m:sty m:val="p"/>
+                      </m:rPr>
+                      <m:t>=</m:t>
+                    </m:r>
+                    <m:rad>
+                      <m:radPr>
+                        <m:degHide m:val="1"/>
+                      </m:radPr>
+                      <m:deg/>
+                      <m:e>
+                        <m:r>
+                          <m:t>I</m:t>
+                        </m:r>
+                        <m:sSubSup>
+                          <m:e>
+                            <m:d>
+                              <m:dPr>
+                                <m:begChr m:val="("/>
+                                <m:endChr m:val=")"/>
+                                <m:sepChr m:val=""/>
+                                <m:grow/>
+                              </m:dPr>
+                              <m:e>
+                                <m:acc>
+                                  <m:accPr>
+                                    <m:chr m:val="̂"/>
+                                  </m:accPr>
+                                  <m:e>
+                                    <m:r>
+                                      <m:t>β</m:t>
+                                    </m:r>
+                                  </m:e>
+                                </m:acc>
+                              </m:e>
+                            </m:d>
+                          </m:e>
+                          <m:sub>
+                            <m:r>
+                              <m:t>j</m:t>
+                            </m:r>
+                            <m:r>
+                              <m:t>j</m:t>
+                            </m:r>
+                          </m:sub>
+                          <m:sup>
+                            <m:r>
+                              <m:rPr>
+                                <m:sty m:val="p"/>
+                              </m:rPr>
+                              <m:t>−</m:t>
+                            </m:r>
+                            <m:r>
+                              <m:t>1</m:t>
+                            </m:r>
+                          </m:sup>
+                        </m:sSubSup>
+                      </m:e>
+                    </m:rad>
+                  </m:oMath>
+                </a14:m>
+              </a:p>
+              <a:p>
+                <a:pPr lvl="1"/>
+                <a14:m>
+                  <m:oMath xmlns:m="http://schemas.openxmlformats.org/officeDocument/2006/math">
+                    <m:r>
+                      <m:t>T</m:t>
+                    </m:r>
+                    <m:r>
+                      <m:rPr>
+                        <m:sty m:val="p"/>
+                      </m:rPr>
+                      <m:t>=</m:t>
+                    </m:r>
+                    <m:f>
+                      <m:fPr>
+                        <m:type m:val="bar"/>
+                      </m:fPr>
+                      <m:num>
+                        <m:acc>
+                          <m:accPr>
+                            <m:chr m:val="̂"/>
+                          </m:accPr>
+                          <m:e>
+                            <m:r>
+                              <m:t>β</m:t>
+                            </m:r>
+                          </m:e>
+                        </m:acc>
+                      </m:num>
+                      <m:den>
+                        <m:r>
+                          <m:t>s</m:t>
+                        </m:r>
+                        <m:r>
+                          <m:t>e</m:t>
+                        </m:r>
+                        <m:d>
+                          <m:dPr>
+                            <m:begChr m:val="("/>
+                            <m:endChr m:val=")"/>
+                            <m:sepChr m:val=""/>
+                            <m:grow/>
+                          </m:dPr>
+                          <m:e>
+                            <m:acc>
+                              <m:accPr>
+                                <m:chr m:val="̂"/>
+                              </m:accPr>
+                              <m:e>
+                                <m:r>
+                                  <m:t>β</m:t>
+                                </m:r>
+                              </m:e>
+                            </m:acc>
+                          </m:e>
+                        </m:d>
+                      </m:den>
+                    </m:f>
+                  </m:oMath>
+                </a14:m>
+              </a:p>
+            </p:txBody>
+          </p:sp>
+        </mc:Choice>
+      </mc:AlternateContent>
+    </p:spTree>
+  </p:cSld>
+</p:sld>
+</file>
+
+<file path=ppt/slides/slide22.xml><?xml version="1.0" encoding="utf-8"?>
+<p:sld xmlns:a="http://schemas.openxmlformats.org/drawingml/2006/main" xmlns:r="http://schemas.openxmlformats.org/officeDocument/2006/relationships" xmlns:p="http://schemas.openxmlformats.org/presentationml/2006/main">
+  <p:cSld>
+    <p:spTree>
+      <p:nvGrpSpPr>
+        <p:cNvPr id="1" name=""/>
+        <p:cNvGrpSpPr/>
+        <p:nvPr/>
+      </p:nvGrpSpPr>
+      <p:grpSpPr>
+        <a:xfrm>
+          <a:off x="0" y="0"/>
+          <a:ext cx="0" cy="0"/>
+          <a:chOff x="0" y="0"/>
+          <a:chExt cx="0" cy="0"/>
+        </a:xfrm>
+      </p:grpSpPr>
+      <p:sp>
+        <p:nvSpPr>
+          <p:cNvPr id="2" name="Title 1"/>
+          <p:cNvSpPr>
+            <a:spLocks noGrp="1"/>
+          </p:cNvSpPr>
+          <p:nvPr>
+            <p:ph type="title"/>
+          </p:nvPr>
+        </p:nvSpPr>
+        <p:spPr/>
+        <p:txBody>
+          <a:bodyPr/>
+          <a:lstStyle/>
+          <a:p>
+            <a:pPr lvl="0" indent="0" marL="0">
+              <a:buNone/>
+            </a:pPr>
+            <a:r>
+              <a:rPr/>
+              <a:t>Robust variance (sandwich estimator)</a:t>
+            </a:r>
+          </a:p>
+        </p:txBody>
+      </p:sp>
+      <mc:AlternateContent xmlns:mc="http://schemas.openxmlformats.org/markup-compatibility/2006">
+        <mc:Choice xmlns:a14="http://schemas.microsoft.com/office/drawing/2010/main" Requires="a14">
+          <p:sp>
+            <p:nvSpPr>
+              <p:cNvPr id="3" name="Content Placeholder 2"/>
+              <p:cNvSpPr>
+                <a:spLocks noGrp="1"/>
+              </p:cNvSpPr>
+              <p:nvPr>
+                <p:ph idx="1"/>
+              </p:nvPr>
+            </p:nvSpPr>
+            <p:spPr/>
+            <p:txBody>
+              <a:bodyPr/>
+              <a:lstStyle/>
+              <a:p>
+                <a:pPr lvl="0"/>
+                <a:r>
+                  <a:rPr/>
+                  <a:t>The variance covariance matrix, </a:t>
+                </a:r>
+                <a14:m>
+                  <m:oMath xmlns:m="http://schemas.openxmlformats.org/officeDocument/2006/math">
+                    <m:r>
+                      <m:t>I</m:t>
+                    </m:r>
+                    <m:sSup>
+                      <m:e>
+                        <m:d>
+                          <m:dPr>
+                            <m:begChr m:val="("/>
+                            <m:endChr m:val=")"/>
+                            <m:sepChr m:val=""/>
+                            <m:grow/>
+                          </m:dPr>
+                          <m:e>
+                            <m:acc>
+                              <m:accPr>
+                                <m:chr m:val="̂"/>
+                              </m:accPr>
+                              <m:e>
+                                <m:r>
+                                  <m:t>β</m:t>
+                                </m:r>
+                              </m:e>
+                            </m:acc>
+                          </m:e>
+                        </m:d>
+                      </m:e>
+                      <m:sup>
+                        <m:r>
+                          <m:rPr>
+                            <m:sty m:val="p"/>
+                          </m:rPr>
+                          <m:t>−</m:t>
+                        </m:r>
+                        <m:r>
+                          <m:t>1</m:t>
+                        </m:r>
+                      </m:sup>
+                    </m:sSup>
+                  </m:oMath>
+                </a14:m>
+                <a:r>
+                  <a:rPr/>
+                  <a:t> is biased.</a:t>
+                </a:r>
+              </a:p>
+              <a:p>
+                <a:pPr lvl="0"/>
+                <a:r>
+                  <a:rPr/>
+                  <a:t>Replace it with the sandwich estimate, </a:t>
+                </a:r>
+                <a14:m>
+                  <m:oMath xmlns:m="http://schemas.openxmlformats.org/officeDocument/2006/math">
+                    <m:r>
+                      <m:t>I</m:t>
+                    </m:r>
+                    <m:sSup>
+                      <m:e>
+                        <m:d>
+                          <m:dPr>
+                            <m:begChr m:val="("/>
+                            <m:endChr m:val=")"/>
+                            <m:sepChr m:val=""/>
+                            <m:grow/>
+                          </m:dPr>
+                          <m:e>
+                            <m:acc>
+                              <m:accPr>
+                                <m:chr m:val="̂"/>
+                              </m:accPr>
+                              <m:e>
+                                <m:r>
+                                  <m:t>β</m:t>
+                                </m:r>
+                              </m:e>
+                            </m:acc>
+                          </m:e>
+                        </m:d>
+                      </m:e>
+                      <m:sup>
+                        <m:r>
+                          <m:rPr>
+                            <m:sty m:val="p"/>
+                          </m:rPr>
+                          <m:t>−</m:t>
+                        </m:r>
+                        <m:r>
+                          <m:t>1</m:t>
+                        </m:r>
+                      </m:sup>
+                    </m:sSup>
+                    <m:d>
+                      <m:dPr>
+                        <m:begChr m:val="("/>
+                        <m:endChr m:val=")"/>
+                        <m:sepChr m:val=""/>
+                        <m:grow/>
+                      </m:dPr>
+                      <m:e>
+                        <m:acc>
+                          <m:accPr>
+                            <m:chr m:val="̂"/>
+                          </m:accPr>
+                          <m:e>
+                            <m:r>
+                              <m:t>L</m:t>
+                            </m:r>
+                          </m:e>
+                        </m:acc>
+                        <m:r>
+                          <m:rPr>
+                            <m:sty m:val="p"/>
+                          </m:rPr>
+                          <m:t>′</m:t>
+                        </m:r>
+                        <m:acc>
+                          <m:accPr>
+                            <m:chr m:val="̂"/>
+                          </m:accPr>
+                          <m:e>
+                            <m:r>
+                              <m:t>L</m:t>
+                            </m:r>
+                          </m:e>
+                        </m:acc>
+                      </m:e>
+                    </m:d>
+                    <m:r>
+                      <m:t>I</m:t>
+                    </m:r>
+                    <m:sSup>
+                      <m:e>
+                        <m:d>
+                          <m:dPr>
+                            <m:begChr m:val="("/>
+                            <m:endChr m:val=")"/>
+                            <m:sepChr m:val=""/>
+                            <m:grow/>
+                          </m:dPr>
+                          <m:e>
+                            <m:acc>
+                              <m:accPr>
+                                <m:chr m:val="̂"/>
+                              </m:accPr>
+                              <m:e>
+                                <m:r>
+                                  <m:t>β</m:t>
+                                </m:r>
+                              </m:e>
+                            </m:acc>
+                          </m:e>
+                        </m:d>
+                      </m:e>
+                      <m:sup>
+                        <m:r>
+                          <m:rPr>
+                            <m:sty m:val="p"/>
+                          </m:rPr>
+                          <m:t>−</m:t>
+                        </m:r>
+                        <m:r>
+                          <m:t>1</m:t>
+                        </m:r>
+                      </m:sup>
+                    </m:sSup>
+                  </m:oMath>
+                </a14:m>
+              </a:p>
+              <a:p>
+                <a:pPr lvl="1"/>
+                <a14:m>
+                  <m:oMath xmlns:m="http://schemas.openxmlformats.org/officeDocument/2006/math">
+                    <m:acc>
+                      <m:accPr>
+                        <m:chr m:val="̂"/>
+                      </m:accPr>
+                      <m:e>
+                        <m:r>
+                          <m:t>L</m:t>
+                        </m:r>
+                      </m:e>
+                    </m:acc>
+                  </m:oMath>
+                </a14:m>
+                <a:r>
+                  <a:rPr/>
+                  <a:t> are score residuals, computed from the score statistic.</a:t>
+                </a:r>
+              </a:p>
+              <a:p>
+                <a:pPr lvl="0"/>
+                <a:r>
+                  <a:rPr/>
+                  <a:t>Comparable to the Generalized Estimating Equations (gee) model.</a:t>
+                </a:r>
+              </a:p>
+            </p:txBody>
+          </p:sp>
+        </mc:Choice>
+      </mc:AlternateContent>
     </p:spTree>
   </p:cSld>
 </p:sld>

</xml_diff>

<commit_message>
Added SAS, Stata, R code to frailty
</commit_message>
<xml_diff>
--- a/frailty/frailty.pptx
+++ b/frailty/frailty.pptx
@@ -5,7 +5,7 @@
     <p:sldMasterId id="2147483648" r:id="rId1"/>
   </p:sldMasterIdLst>
   <p:notesMasterIdLst>
-    <p:notesMasterId r:id="rId24"/>
+    <p:notesMasterId r:id="rId52"/>
   </p:notesMasterIdLst>
   <p:sldIdLst>
     <p:sldId id="256" r:id="rId2"/>
@@ -30,6 +30,34 @@
     <p:sldId id="275" r:id="rId21"/>
     <p:sldId id="276" r:id="rId22"/>
     <p:sldId id="277" r:id="rId23"/>
+    <p:sldId id="278" r:id="rId24"/>
+    <p:sldId id="279" r:id="rId25"/>
+    <p:sldId id="280" r:id="rId26"/>
+    <p:sldId id="281" r:id="rId27"/>
+    <p:sldId id="282" r:id="rId28"/>
+    <p:sldId id="283" r:id="rId29"/>
+    <p:sldId id="284" r:id="rId30"/>
+    <p:sldId id="285" r:id="rId31"/>
+    <p:sldId id="286" r:id="rId32"/>
+    <p:sldId id="287" r:id="rId33"/>
+    <p:sldId id="288" r:id="rId34"/>
+    <p:sldId id="289" r:id="rId35"/>
+    <p:sldId id="290" r:id="rId36"/>
+    <p:sldId id="291" r:id="rId37"/>
+    <p:sldId id="292" r:id="rId38"/>
+    <p:sldId id="293" r:id="rId39"/>
+    <p:sldId id="294" r:id="rId40"/>
+    <p:sldId id="295" r:id="rId41"/>
+    <p:sldId id="296" r:id="rId42"/>
+    <p:sldId id="297" r:id="rId43"/>
+    <p:sldId id="298" r:id="rId44"/>
+    <p:sldId id="299" r:id="rId45"/>
+    <p:sldId id="300" r:id="rId46"/>
+    <p:sldId id="301" r:id="rId47"/>
+    <p:sldId id="302" r:id="rId48"/>
+    <p:sldId id="303" r:id="rId49"/>
+    <p:sldId id="304" r:id="rId50"/>
+    <p:sldId id="305" r:id="rId51"/>
   </p:sldIdLst>
   <p:sldSz cx="9144000" cy="5143500" type="screen16x9"/>
   <p:notesSz cx="6858000" cy="9144000"/>
@@ -8007,6 +8035,546 @@
 </p:sld>
 </file>
 
+<file path=ppt/slides/slide23.xml><?xml version="1.0" encoding="utf-8"?>
+<p:sld xmlns:a="http://schemas.openxmlformats.org/drawingml/2006/main" xmlns:r="http://schemas.openxmlformats.org/officeDocument/2006/relationships" xmlns:p="http://schemas.openxmlformats.org/presentationml/2006/main">
+  <p:cSld>
+    <p:spTree>
+      <p:nvGrpSpPr>
+        <p:cNvPr id="1" name=""/>
+        <p:cNvGrpSpPr/>
+        <p:nvPr/>
+      </p:nvGrpSpPr>
+      <p:grpSpPr>
+        <a:xfrm>
+          <a:off x="0" y="0"/>
+          <a:ext cx="0" cy="0"/>
+          <a:chOff x="0" y="0"/>
+          <a:chExt cx="0" cy="0"/>
+        </a:xfrm>
+      </p:grpSpPr>
+      <p:sp>
+        <p:nvSpPr>
+          <p:cNvPr id="2" name="Title 1"/>
+          <p:cNvSpPr>
+            <a:spLocks noGrp="1"/>
+          </p:cNvSpPr>
+          <p:nvPr>
+            <p:ph type="title"/>
+          </p:nvPr>
+        </p:nvSpPr>
+        <p:spPr/>
+        <p:txBody>
+          <a:bodyPr/>
+          <a:lstStyle/>
+          <a:p>
+            <a:pPr lvl="0" indent="0" marL="0">
+              <a:buNone/>
+            </a:pPr>
+            <a:r>
+              <a:rPr/>
+              <a:t>Rats data</a:t>
+            </a:r>
+          </a:p>
+        </p:txBody>
+      </p:sp>
+      <p:sp>
+        <p:nvSpPr>
+          <p:cNvPr id="3" name="Content Placeholder 2"/>
+          <p:cNvSpPr>
+            <a:spLocks noGrp="1"/>
+          </p:cNvSpPr>
+          <p:nvPr>
+            <p:ph idx="1"/>
+          </p:nvPr>
+        </p:nvSpPr>
+        <p:spPr/>
+        <p:txBody>
+          <a:bodyPr/>
+          <a:lstStyle/>
+          <a:p>
+            <a:pPr lvl="0" indent="0">
+              <a:buNone/>
+            </a:pPr>
+            <a:r>
+              <a:rPr>
+                <a:latin typeface="Courier"/>
+              </a:rPr>
+              <a:t>  litter rx time status sex
+1      1  1  101      0   f
+2      1  0   49      1   f
+3      1  0  104      0   f
+4      2  1   91      0   m
+5      2  0  104      0   m
+6      2  0  102      0   m
+7      3  1  104      0   f</a:t>
+            </a:r>
+          </a:p>
+        </p:txBody>
+      </p:sp>
+    </p:spTree>
+  </p:cSld>
+</p:sld>
+</file>
+
+<file path=ppt/slides/slide24.xml><?xml version="1.0" encoding="utf-8"?>
+<p:sld xmlns:a="http://schemas.openxmlformats.org/drawingml/2006/main" xmlns:r="http://schemas.openxmlformats.org/officeDocument/2006/relationships" xmlns:p="http://schemas.openxmlformats.org/presentationml/2006/main">
+  <p:cSld>
+    <p:spTree>
+      <p:nvGrpSpPr>
+        <p:cNvPr id="1" name=""/>
+        <p:cNvGrpSpPr/>
+        <p:nvPr/>
+      </p:nvGrpSpPr>
+      <p:grpSpPr>
+        <a:xfrm>
+          <a:off x="0" y="0"/>
+          <a:ext cx="0" cy="0"/>
+          <a:chOff x="0" y="0"/>
+          <a:chExt cx="0" cy="0"/>
+        </a:xfrm>
+      </p:grpSpPr>
+      <p:sp>
+        <p:nvSpPr>
+          <p:cNvPr id="2" name="Title 1"/>
+          <p:cNvSpPr>
+            <a:spLocks noGrp="1"/>
+          </p:cNvSpPr>
+          <p:nvPr>
+            <p:ph type="title"/>
+          </p:nvPr>
+        </p:nvSpPr>
+        <p:spPr/>
+        <p:txBody>
+          <a:bodyPr/>
+          <a:lstStyle/>
+          <a:p>
+            <a:pPr lvl="0" indent="0" marL="0">
+              <a:buNone/>
+            </a:pPr>
+            <a:r>
+              <a:rPr/>
+              <a:t>Analysis ignoring litter effect, Stata, 1 of 2</a:t>
+            </a:r>
+          </a:p>
+        </p:txBody>
+      </p:sp>
+      <p:sp>
+        <p:nvSpPr>
+          <p:cNvPr id="3" name="Content Placeholder 2"/>
+          <p:cNvSpPr>
+            <a:spLocks noGrp="1"/>
+          </p:cNvSpPr>
+          <p:nvPr>
+            <p:ph idx="1"/>
+          </p:nvPr>
+        </p:nvSpPr>
+        <p:spPr/>
+        <p:txBody>
+          <a:bodyPr/>
+          <a:lstStyle/>
+          <a:p>
+            <a:pPr lvl="0" indent="0">
+              <a:buNone/>
+            </a:pPr>
+            <a:r>
+              <a:rPr>
+                <a:latin typeface="Courier"/>
+              </a:rPr>
+              <a:t>stset time, failure(status)
+stcox rx</a:t>
+            </a:r>
+          </a:p>
+        </p:txBody>
+      </p:sp>
+    </p:spTree>
+  </p:cSld>
+</p:sld>
+</file>
+
+<file path=ppt/slides/slide25.xml><?xml version="1.0" encoding="utf-8"?>
+<p:sld xmlns:a="http://schemas.openxmlformats.org/drawingml/2006/main" xmlns:r="http://schemas.openxmlformats.org/officeDocument/2006/relationships" xmlns:p="http://schemas.openxmlformats.org/presentationml/2006/main">
+  <p:cSld>
+    <p:spTree>
+      <p:nvGrpSpPr>
+        <p:cNvPr id="1" name=""/>
+        <p:cNvGrpSpPr/>
+        <p:nvPr/>
+      </p:nvGrpSpPr>
+      <p:grpSpPr>
+        <a:xfrm>
+          <a:off x="0" y="0"/>
+          <a:ext cx="0" cy="0"/>
+          <a:chOff x="0" y="0"/>
+          <a:chExt cx="0" cy="0"/>
+        </a:xfrm>
+      </p:grpSpPr>
+      <p:sp>
+        <p:nvSpPr>
+          <p:cNvPr id="2" name="Title 1"/>
+          <p:cNvSpPr>
+            <a:spLocks noGrp="1"/>
+          </p:cNvSpPr>
+          <p:nvPr>
+            <p:ph type="title"/>
+          </p:nvPr>
+        </p:nvSpPr>
+        <p:spPr/>
+        <p:txBody>
+          <a:bodyPr/>
+          <a:lstStyle/>
+          <a:p>
+            <a:pPr lvl="0" indent="0" marL="0">
+              <a:buNone/>
+            </a:pPr>
+            <a:r>
+              <a:rPr/>
+              <a:t>Analysis ignoring litter effect, Stata, 2 of 2</a:t>
+            </a:r>
+          </a:p>
+        </p:txBody>
+      </p:sp>
+      <p:pic>
+        <p:nvPicPr>
+          <p:cNvPr descr="stata-01.png" id="0" name="Picture 1"/>
+          <p:cNvPicPr>
+            <a:picLocks noGrp="1" noChangeAspect="1"/>
+          </p:cNvPicPr>
+          <p:nvPr/>
+        </p:nvPicPr>
+        <p:blipFill>
+          <a:blip r:embed="rId2"/>
+          <a:stretch>
+            <a:fillRect/>
+          </a:stretch>
+        </p:blipFill>
+        <p:spPr bwMode="auto">
+          <a:xfrm>
+            <a:off x="457200" y="1295400"/>
+            <a:ext cx="8229600" cy="3187700"/>
+          </a:xfrm>
+          <a:prstGeom prst="rect">
+            <a:avLst/>
+          </a:prstGeom>
+          <a:noFill/>
+          <a:ln w="9525">
+            <a:noFill/>
+            <a:headEnd/>
+            <a:tailEnd/>
+          </a:ln>
+        </p:spPr>
+      </p:pic>
+    </p:spTree>
+  </p:cSld>
+</p:sld>
+</file>
+
+<file path=ppt/slides/slide26.xml><?xml version="1.0" encoding="utf-8"?>
+<p:sld xmlns:a="http://schemas.openxmlformats.org/drawingml/2006/main" xmlns:r="http://schemas.openxmlformats.org/officeDocument/2006/relationships" xmlns:p="http://schemas.openxmlformats.org/presentationml/2006/main">
+  <p:cSld>
+    <p:spTree>
+      <p:nvGrpSpPr>
+        <p:cNvPr id="1" name=""/>
+        <p:cNvGrpSpPr/>
+        <p:nvPr/>
+      </p:nvGrpSpPr>
+      <p:grpSpPr>
+        <a:xfrm>
+          <a:off x="0" y="0"/>
+          <a:ext cx="0" cy="0"/>
+          <a:chOff x="0" y="0"/>
+          <a:chExt cx="0" cy="0"/>
+        </a:xfrm>
+      </p:grpSpPr>
+      <p:sp>
+        <p:nvSpPr>
+          <p:cNvPr id="2" name="Title 1"/>
+          <p:cNvSpPr>
+            <a:spLocks noGrp="1"/>
+          </p:cNvSpPr>
+          <p:nvPr>
+            <p:ph type="title"/>
+          </p:nvPr>
+        </p:nvSpPr>
+        <p:spPr/>
+        <p:txBody>
+          <a:bodyPr/>
+          <a:lstStyle/>
+          <a:p>
+            <a:pPr lvl="0" indent="0" marL="0">
+              <a:buNone/>
+            </a:pPr>
+            <a:r>
+              <a:rPr/>
+              <a:t>Analysis ignoring litter effect, SAS, 1 of 4</a:t>
+            </a:r>
+          </a:p>
+        </p:txBody>
+      </p:sp>
+      <p:sp>
+        <p:nvSpPr>
+          <p:cNvPr id="3" name="Content Placeholder 2"/>
+          <p:cNvSpPr>
+            <a:spLocks noGrp="1"/>
+          </p:cNvSpPr>
+          <p:nvPr>
+            <p:ph idx="1"/>
+          </p:nvPr>
+        </p:nvSpPr>
+        <p:spPr/>
+        <p:txBody>
+          <a:bodyPr/>
+          <a:lstStyle/>
+          <a:p>
+            <a:pPr lvl="0" indent="0">
+              <a:buNone/>
+            </a:pPr>
+            <a:r>
+              <a:rPr>
+                <a:latin typeface="Courier"/>
+              </a:rPr>
+              <a:t>proc phreg data=storage.rats;
+  model time*status(0) = rx;
+run;</a:t>
+            </a:r>
+          </a:p>
+        </p:txBody>
+      </p:sp>
+    </p:spTree>
+  </p:cSld>
+</p:sld>
+</file>
+
+<file path=ppt/slides/slide27.xml><?xml version="1.0" encoding="utf-8"?>
+<p:sld xmlns:a="http://schemas.openxmlformats.org/drawingml/2006/main" xmlns:r="http://schemas.openxmlformats.org/officeDocument/2006/relationships" xmlns:p="http://schemas.openxmlformats.org/presentationml/2006/main">
+  <p:cSld>
+    <p:spTree>
+      <p:nvGrpSpPr>
+        <p:cNvPr id="1" name=""/>
+        <p:cNvGrpSpPr/>
+        <p:nvPr/>
+      </p:nvGrpSpPr>
+      <p:grpSpPr>
+        <a:xfrm>
+          <a:off x="0" y="0"/>
+          <a:ext cx="0" cy="0"/>
+          <a:chOff x="0" y="0"/>
+          <a:chExt cx="0" cy="0"/>
+        </a:xfrm>
+      </p:grpSpPr>
+      <p:sp>
+        <p:nvSpPr>
+          <p:cNvPr id="2" name="Title 1"/>
+          <p:cNvSpPr>
+            <a:spLocks noGrp="1"/>
+          </p:cNvSpPr>
+          <p:nvPr>
+            <p:ph type="title"/>
+          </p:nvPr>
+        </p:nvSpPr>
+        <p:spPr/>
+        <p:txBody>
+          <a:bodyPr/>
+          <a:lstStyle/>
+          <a:p>
+            <a:pPr lvl="0" indent="0" marL="0">
+              <a:buNone/>
+            </a:pPr>
+            <a:r>
+              <a:rPr/>
+              <a:t>Analysis ignoring litter effect, SAS, 2 of 4</a:t>
+            </a:r>
+          </a:p>
+        </p:txBody>
+      </p:sp>
+      <p:pic>
+        <p:nvPicPr>
+          <p:cNvPr descr="sas-01.png" id="0" name="Picture 1"/>
+          <p:cNvPicPr>
+            <a:picLocks noGrp="1" noChangeAspect="1"/>
+          </p:cNvPicPr>
+          <p:nvPr/>
+        </p:nvPicPr>
+        <p:blipFill>
+          <a:blip r:embed="rId2"/>
+          <a:stretch>
+            <a:fillRect/>
+          </a:stretch>
+        </p:blipFill>
+        <p:spPr bwMode="auto">
+          <a:xfrm>
+            <a:off x="457200" y="2095500"/>
+            <a:ext cx="8229600" cy="1587500"/>
+          </a:xfrm>
+          <a:prstGeom prst="rect">
+            <a:avLst/>
+          </a:prstGeom>
+          <a:noFill/>
+          <a:ln w="9525">
+            <a:noFill/>
+            <a:headEnd/>
+            <a:tailEnd/>
+          </a:ln>
+        </p:spPr>
+      </p:pic>
+    </p:spTree>
+  </p:cSld>
+</p:sld>
+</file>
+
+<file path=ppt/slides/slide28.xml><?xml version="1.0" encoding="utf-8"?>
+<p:sld xmlns:a="http://schemas.openxmlformats.org/drawingml/2006/main" xmlns:r="http://schemas.openxmlformats.org/officeDocument/2006/relationships" xmlns:p="http://schemas.openxmlformats.org/presentationml/2006/main">
+  <p:cSld>
+    <p:spTree>
+      <p:nvGrpSpPr>
+        <p:cNvPr id="1" name=""/>
+        <p:cNvGrpSpPr/>
+        <p:nvPr/>
+      </p:nvGrpSpPr>
+      <p:grpSpPr>
+        <a:xfrm>
+          <a:off x="0" y="0"/>
+          <a:ext cx="0" cy="0"/>
+          <a:chOff x="0" y="0"/>
+          <a:chExt cx="0" cy="0"/>
+        </a:xfrm>
+      </p:grpSpPr>
+      <p:sp>
+        <p:nvSpPr>
+          <p:cNvPr id="2" name="Title 1"/>
+          <p:cNvSpPr>
+            <a:spLocks noGrp="1"/>
+          </p:cNvSpPr>
+          <p:nvPr>
+            <p:ph type="title"/>
+          </p:nvPr>
+        </p:nvSpPr>
+        <p:spPr/>
+        <p:txBody>
+          <a:bodyPr/>
+          <a:lstStyle/>
+          <a:p>
+            <a:pPr lvl="0" indent="0" marL="0">
+              <a:buNone/>
+            </a:pPr>
+            <a:r>
+              <a:rPr/>
+              <a:t>Analysis ignoring litter effect, SAS, 3 of 4</a:t>
+            </a:r>
+          </a:p>
+        </p:txBody>
+      </p:sp>
+      <p:pic>
+        <p:nvPicPr>
+          <p:cNvPr descr="sas-02.png" id="0" name="Picture 1"/>
+          <p:cNvPicPr>
+            <a:picLocks noGrp="1" noChangeAspect="1"/>
+          </p:cNvPicPr>
+          <p:nvPr/>
+        </p:nvPicPr>
+        <p:blipFill>
+          <a:blip r:embed="rId2"/>
+          <a:stretch>
+            <a:fillRect/>
+          </a:stretch>
+        </p:blipFill>
+        <p:spPr bwMode="auto">
+          <a:xfrm>
+            <a:off x="457200" y="2146300"/>
+            <a:ext cx="8229600" cy="1473200"/>
+          </a:xfrm>
+          <a:prstGeom prst="rect">
+            <a:avLst/>
+          </a:prstGeom>
+          <a:noFill/>
+          <a:ln w="9525">
+            <a:noFill/>
+            <a:headEnd/>
+            <a:tailEnd/>
+          </a:ln>
+        </p:spPr>
+      </p:pic>
+    </p:spTree>
+  </p:cSld>
+</p:sld>
+</file>
+
+<file path=ppt/slides/slide29.xml><?xml version="1.0" encoding="utf-8"?>
+<p:sld xmlns:a="http://schemas.openxmlformats.org/drawingml/2006/main" xmlns:r="http://schemas.openxmlformats.org/officeDocument/2006/relationships" xmlns:p="http://schemas.openxmlformats.org/presentationml/2006/main">
+  <p:cSld>
+    <p:spTree>
+      <p:nvGrpSpPr>
+        <p:cNvPr id="1" name=""/>
+        <p:cNvGrpSpPr/>
+        <p:nvPr/>
+      </p:nvGrpSpPr>
+      <p:grpSpPr>
+        <a:xfrm>
+          <a:off x="0" y="0"/>
+          <a:ext cx="0" cy="0"/>
+          <a:chOff x="0" y="0"/>
+          <a:chExt cx="0" cy="0"/>
+        </a:xfrm>
+      </p:grpSpPr>
+      <p:sp>
+        <p:nvSpPr>
+          <p:cNvPr id="2" name="Title 1"/>
+          <p:cNvSpPr>
+            <a:spLocks noGrp="1"/>
+          </p:cNvSpPr>
+          <p:nvPr>
+            <p:ph type="title"/>
+          </p:nvPr>
+        </p:nvSpPr>
+        <p:spPr/>
+        <p:txBody>
+          <a:bodyPr/>
+          <a:lstStyle/>
+          <a:p>
+            <a:pPr lvl="0" indent="0" marL="0">
+              <a:buNone/>
+            </a:pPr>
+            <a:r>
+              <a:rPr/>
+              <a:t>Analysis ignoring litter effect, SAS, 4 of 4</a:t>
+            </a:r>
+          </a:p>
+        </p:txBody>
+      </p:sp>
+      <p:pic>
+        <p:nvPicPr>
+          <p:cNvPr descr="sas-03.png" id="0" name="Picture 1"/>
+          <p:cNvPicPr>
+            <a:picLocks noGrp="1" noChangeAspect="1"/>
+          </p:cNvPicPr>
+          <p:nvPr/>
+        </p:nvPicPr>
+        <p:blipFill>
+          <a:blip r:embed="rId2"/>
+          <a:stretch>
+            <a:fillRect/>
+          </a:stretch>
+        </p:blipFill>
+        <p:spPr bwMode="auto">
+          <a:xfrm>
+            <a:off x="457200" y="2336800"/>
+            <a:ext cx="8229600" cy="1117600"/>
+          </a:xfrm>
+          <a:prstGeom prst="rect">
+            <a:avLst/>
+          </a:prstGeom>
+          <a:noFill/>
+          <a:ln w="9525">
+            <a:noFill/>
+            <a:headEnd/>
+            <a:tailEnd/>
+          </a:ln>
+        </p:spPr>
+      </p:pic>
+    </p:spTree>
+  </p:cSld>
+</p:sld>
+</file>
+
 <file path=ppt/slides/slide3.xml><?xml version="1.0" encoding="utf-8"?>
 <p:sld xmlns:a="http://schemas.openxmlformats.org/drawingml/2006/main" xmlns:r="http://schemas.openxmlformats.org/officeDocument/2006/relationships" xmlns:p="http://schemas.openxmlformats.org/presentationml/2006/main">
   <p:cSld>
@@ -8080,6 +8648,772 @@
   49  72%    70  36%    96   0%
   54  68%    71  32%  
   56  64%    72  38%</a:t>
+            </a:r>
+          </a:p>
+        </p:txBody>
+      </p:sp>
+    </p:spTree>
+  </p:cSld>
+</p:sld>
+</file>
+
+<file path=ppt/slides/slide30.xml><?xml version="1.0" encoding="utf-8"?>
+<p:sld xmlns:a="http://schemas.openxmlformats.org/drawingml/2006/main" xmlns:r="http://schemas.openxmlformats.org/officeDocument/2006/relationships" xmlns:p="http://schemas.openxmlformats.org/presentationml/2006/main">
+  <p:cSld>
+    <p:spTree>
+      <p:nvGrpSpPr>
+        <p:cNvPr id="1" name=""/>
+        <p:cNvGrpSpPr/>
+        <p:nvPr/>
+      </p:nvGrpSpPr>
+      <p:grpSpPr>
+        <a:xfrm>
+          <a:off x="0" y="0"/>
+          <a:ext cx="0" cy="0"/>
+          <a:chOff x="0" y="0"/>
+          <a:chExt cx="0" cy="0"/>
+        </a:xfrm>
+      </p:grpSpPr>
+      <p:sp>
+        <p:nvSpPr>
+          <p:cNvPr id="2" name="Title 1"/>
+          <p:cNvSpPr>
+            <a:spLocks noGrp="1"/>
+          </p:cNvSpPr>
+          <p:nvPr>
+            <p:ph type="title"/>
+          </p:nvPr>
+        </p:nvSpPr>
+        <p:spPr/>
+        <p:txBody>
+          <a:bodyPr/>
+          <a:lstStyle/>
+          <a:p>
+            <a:pPr lvl="0" indent="0" marL="0">
+              <a:buNone/>
+            </a:pPr>
+            <a:r>
+              <a:rPr/>
+              <a:t>Analysis ignoring litter effect, R, 1 of 2</a:t>
+            </a:r>
+          </a:p>
+        </p:txBody>
+      </p:sp>
+      <p:sp>
+        <p:nvSpPr>
+          <p:cNvPr id="3" name="Content Placeholder 2"/>
+          <p:cNvSpPr>
+            <a:spLocks noGrp="1"/>
+          </p:cNvSpPr>
+          <p:nvPr>
+            <p:ph idx="1"/>
+          </p:nvPr>
+        </p:nvSpPr>
+        <p:spPr/>
+        <p:txBody>
+          <a:bodyPr/>
+          <a:lstStyle/>
+          <a:p>
+            <a:pPr lvl="0" indent="0">
+              <a:buNone/>
+            </a:pPr>
+            <a:r>
+              <a:rPr>
+                <a:latin typeface="Courier"/>
+              </a:rPr>
+              <a:t>rats_surv &lt;- Surv(rats$time, rats$status)
+coxph(rats_surv ~ rx, data=rats)</a:t>
+            </a:r>
+          </a:p>
+        </p:txBody>
+      </p:sp>
+    </p:spTree>
+  </p:cSld>
+</p:sld>
+</file>
+
+<file path=ppt/slides/slide31.xml><?xml version="1.0" encoding="utf-8"?>
+<p:sld xmlns:a="http://schemas.openxmlformats.org/drawingml/2006/main" xmlns:r="http://schemas.openxmlformats.org/officeDocument/2006/relationships" xmlns:p="http://schemas.openxmlformats.org/presentationml/2006/main">
+  <p:cSld>
+    <p:spTree>
+      <p:nvGrpSpPr>
+        <p:cNvPr id="1" name=""/>
+        <p:cNvGrpSpPr/>
+        <p:nvPr/>
+      </p:nvGrpSpPr>
+      <p:grpSpPr>
+        <a:xfrm>
+          <a:off x="0" y="0"/>
+          <a:ext cx="0" cy="0"/>
+          <a:chOff x="0" y="0"/>
+          <a:chExt cx="0" cy="0"/>
+        </a:xfrm>
+      </p:grpSpPr>
+      <p:sp>
+        <p:nvSpPr>
+          <p:cNvPr id="2" name="Title 1"/>
+          <p:cNvSpPr>
+            <a:spLocks noGrp="1"/>
+          </p:cNvSpPr>
+          <p:nvPr>
+            <p:ph type="title"/>
+          </p:nvPr>
+        </p:nvSpPr>
+        <p:spPr/>
+        <p:txBody>
+          <a:bodyPr/>
+          <a:lstStyle/>
+          <a:p>
+            <a:pPr lvl="0" indent="0" marL="0">
+              <a:buNone/>
+            </a:pPr>
+            <a:r>
+              <a:rPr/>
+              <a:t>Analysis ignoring litter effect, R, 2 of 2</a:t>
+            </a:r>
+          </a:p>
+        </p:txBody>
+      </p:sp>
+      <p:sp>
+        <p:nvSpPr>
+          <p:cNvPr id="3" name="Content Placeholder 2"/>
+          <p:cNvSpPr>
+            <a:spLocks noGrp="1"/>
+          </p:cNvSpPr>
+          <p:nvPr>
+            <p:ph idx="1"/>
+          </p:nvPr>
+        </p:nvSpPr>
+        <p:spPr/>
+        <p:txBody>
+          <a:bodyPr/>
+          <a:lstStyle/>
+          <a:p>
+            <a:pPr lvl="0" indent="0">
+              <a:buNone/>
+            </a:pPr>
+            <a:r>
+              <a:rPr>
+                <a:latin typeface="Courier"/>
+              </a:rPr>
+              <a:t>Call:
+coxph(formula = rats_surv ~ rx, data = rats)
+     coef exp(coef) se(coef)     z      p
+rx 0.7137    2.0416   0.3088 2.311 0.0208
+Likelihood ratio test=5.23  on 1 df, p=0.02215
+n= 300, number of events= 42 </a:t>
+            </a:r>
+          </a:p>
+        </p:txBody>
+      </p:sp>
+    </p:spTree>
+  </p:cSld>
+</p:sld>
+</file>
+
+<file path=ppt/slides/slide32.xml><?xml version="1.0" encoding="utf-8"?>
+<p:sld xmlns:a="http://schemas.openxmlformats.org/drawingml/2006/main" xmlns:r="http://schemas.openxmlformats.org/officeDocument/2006/relationships" xmlns:p="http://schemas.openxmlformats.org/presentationml/2006/main">
+  <p:cSld>
+    <p:spTree>
+      <p:nvGrpSpPr>
+        <p:cNvPr id="1" name=""/>
+        <p:cNvGrpSpPr/>
+        <p:nvPr/>
+      </p:nvGrpSpPr>
+      <p:grpSpPr>
+        <a:xfrm>
+          <a:off x="0" y="0"/>
+          <a:ext cx="0" cy="0"/>
+          <a:chOff x="0" y="0"/>
+          <a:chExt cx="0" cy="0"/>
+        </a:xfrm>
+      </p:grpSpPr>
+      <p:sp>
+        <p:nvSpPr>
+          <p:cNvPr id="2" name="Title 1"/>
+          <p:cNvSpPr>
+            <a:spLocks noGrp="1"/>
+          </p:cNvSpPr>
+          <p:nvPr>
+            <p:ph type="title"/>
+          </p:nvPr>
+        </p:nvSpPr>
+        <p:spPr/>
+        <p:txBody>
+          <a:bodyPr/>
+          <a:lstStyle/>
+          <a:p>
+            <a:pPr lvl="0" indent="0" marL="0">
+              <a:buNone/>
+            </a:pPr>
+            <a:r>
+              <a:rPr/>
+              <a:t>Analysis ignoring litter effect, Stata, 1 of 2</a:t>
+            </a:r>
+          </a:p>
+        </p:txBody>
+      </p:sp>
+      <p:sp>
+        <p:nvSpPr>
+          <p:cNvPr id="3" name="Content Placeholder 2"/>
+          <p:cNvSpPr>
+            <a:spLocks noGrp="1"/>
+          </p:cNvSpPr>
+          <p:nvPr>
+            <p:ph idx="1"/>
+          </p:nvPr>
+        </p:nvSpPr>
+        <p:spPr/>
+        <p:txBody>
+          <a:bodyPr/>
+          <a:lstStyle/>
+          <a:p>
+            <a:pPr lvl="0" indent="0">
+              <a:buNone/>
+            </a:pPr>
+            <a:r>
+              <a:rPr>
+                <a:latin typeface="Courier"/>
+              </a:rPr>
+              <a:t>stset time, failure(status)
+stcox rx</a:t>
+            </a:r>
+          </a:p>
+        </p:txBody>
+      </p:sp>
+    </p:spTree>
+  </p:cSld>
+</p:sld>
+</file>
+
+<file path=ppt/slides/slide33.xml><?xml version="1.0" encoding="utf-8"?>
+<p:sld xmlns:a="http://schemas.openxmlformats.org/drawingml/2006/main" xmlns:r="http://schemas.openxmlformats.org/officeDocument/2006/relationships" xmlns:p="http://schemas.openxmlformats.org/presentationml/2006/main">
+  <p:cSld>
+    <p:spTree>
+      <p:nvGrpSpPr>
+        <p:cNvPr id="1" name=""/>
+        <p:cNvGrpSpPr/>
+        <p:nvPr/>
+      </p:nvGrpSpPr>
+      <p:grpSpPr>
+        <a:xfrm>
+          <a:off x="0" y="0"/>
+          <a:ext cx="0" cy="0"/>
+          <a:chOff x="0" y="0"/>
+          <a:chExt cx="0" cy="0"/>
+        </a:xfrm>
+      </p:grpSpPr>
+      <p:sp>
+        <p:nvSpPr>
+          <p:cNvPr id="2" name="Title 1"/>
+          <p:cNvSpPr>
+            <a:spLocks noGrp="1"/>
+          </p:cNvSpPr>
+          <p:nvPr>
+            <p:ph type="title"/>
+          </p:nvPr>
+        </p:nvSpPr>
+        <p:spPr/>
+        <p:txBody>
+          <a:bodyPr/>
+          <a:lstStyle/>
+          <a:p>
+            <a:pPr lvl="0" indent="0" marL="0">
+              <a:buNone/>
+            </a:pPr>
+            <a:r>
+              <a:rPr/>
+              <a:t>Analysis ignoring litter effect, Stata, 2 of 2</a:t>
+            </a:r>
+          </a:p>
+        </p:txBody>
+      </p:sp>
+      <p:pic>
+        <p:nvPicPr>
+          <p:cNvPr descr="stata-01.png" id="0" name="Picture 1"/>
+          <p:cNvPicPr>
+            <a:picLocks noGrp="1" noChangeAspect="1"/>
+          </p:cNvPicPr>
+          <p:nvPr/>
+        </p:nvPicPr>
+        <p:blipFill>
+          <a:blip r:embed="rId2"/>
+          <a:stretch>
+            <a:fillRect/>
+          </a:stretch>
+        </p:blipFill>
+        <p:spPr bwMode="auto">
+          <a:xfrm>
+            <a:off x="457200" y="1295400"/>
+            <a:ext cx="8229600" cy="3187700"/>
+          </a:xfrm>
+          <a:prstGeom prst="rect">
+            <a:avLst/>
+          </a:prstGeom>
+          <a:noFill/>
+          <a:ln w="9525">
+            <a:noFill/>
+            <a:headEnd/>
+            <a:tailEnd/>
+          </a:ln>
+        </p:spPr>
+      </p:pic>
+    </p:spTree>
+  </p:cSld>
+</p:sld>
+</file>
+
+<file path=ppt/slides/slide34.xml><?xml version="1.0" encoding="utf-8"?>
+<p:sld xmlns:a="http://schemas.openxmlformats.org/drawingml/2006/main" xmlns:r="http://schemas.openxmlformats.org/officeDocument/2006/relationships" xmlns:p="http://schemas.openxmlformats.org/presentationml/2006/main">
+  <p:cSld>
+    <p:spTree>
+      <p:nvGrpSpPr>
+        <p:cNvPr id="1" name=""/>
+        <p:cNvGrpSpPr/>
+        <p:nvPr/>
+      </p:nvGrpSpPr>
+      <p:grpSpPr>
+        <a:xfrm>
+          <a:off x="0" y="0"/>
+          <a:ext cx="0" cy="0"/>
+          <a:chOff x="0" y="0"/>
+          <a:chExt cx="0" cy="0"/>
+        </a:xfrm>
+      </p:grpSpPr>
+      <p:sp>
+        <p:nvSpPr>
+          <p:cNvPr id="2" name="Title 1"/>
+          <p:cNvSpPr>
+            <a:spLocks noGrp="1"/>
+          </p:cNvSpPr>
+          <p:nvPr>
+            <p:ph type="title"/>
+          </p:nvPr>
+        </p:nvSpPr>
+        <p:spPr/>
+        <p:txBody>
+          <a:bodyPr/>
+          <a:lstStyle/>
+          <a:p>
+            <a:pPr lvl="0" indent="0" marL="0">
+              <a:buNone/>
+            </a:pPr>
+            <a:r>
+              <a:rPr/>
+              <a:t>Analysis ignoring litter effect, SAS, 1 of 4</a:t>
+            </a:r>
+          </a:p>
+        </p:txBody>
+      </p:sp>
+      <p:sp>
+        <p:nvSpPr>
+          <p:cNvPr id="3" name="Content Placeholder 2"/>
+          <p:cNvSpPr>
+            <a:spLocks noGrp="1"/>
+          </p:cNvSpPr>
+          <p:nvPr>
+            <p:ph idx="1"/>
+          </p:nvPr>
+        </p:nvSpPr>
+        <p:spPr/>
+        <p:txBody>
+          <a:bodyPr/>
+          <a:lstStyle/>
+          <a:p>
+            <a:pPr lvl="0" indent="0">
+              <a:buNone/>
+            </a:pPr>
+            <a:r>
+              <a:rPr>
+                <a:latin typeface="Courier"/>
+              </a:rPr>
+              <a:t>proc phreg data=storage.rats covs(aggregate);
+  model time*status(0) = rx;
+  id litter;
+run;</a:t>
+            </a:r>
+          </a:p>
+        </p:txBody>
+      </p:sp>
+    </p:spTree>
+  </p:cSld>
+</p:sld>
+</file>
+
+<file path=ppt/slides/slide35.xml><?xml version="1.0" encoding="utf-8"?>
+<p:sld xmlns:a="http://schemas.openxmlformats.org/drawingml/2006/main" xmlns:r="http://schemas.openxmlformats.org/officeDocument/2006/relationships" xmlns:p="http://schemas.openxmlformats.org/presentationml/2006/main">
+  <p:cSld>
+    <p:spTree>
+      <p:nvGrpSpPr>
+        <p:cNvPr id="1" name=""/>
+        <p:cNvGrpSpPr/>
+        <p:nvPr/>
+      </p:nvGrpSpPr>
+      <p:grpSpPr>
+        <a:xfrm>
+          <a:off x="0" y="0"/>
+          <a:ext cx="0" cy="0"/>
+          <a:chOff x="0" y="0"/>
+          <a:chExt cx="0" cy="0"/>
+        </a:xfrm>
+      </p:grpSpPr>
+      <p:sp>
+        <p:nvSpPr>
+          <p:cNvPr id="2" name="Title 1"/>
+          <p:cNvSpPr>
+            <a:spLocks noGrp="1"/>
+          </p:cNvSpPr>
+          <p:nvPr>
+            <p:ph type="title"/>
+          </p:nvPr>
+        </p:nvSpPr>
+        <p:spPr/>
+        <p:txBody>
+          <a:bodyPr/>
+          <a:lstStyle/>
+          <a:p>
+            <a:pPr lvl="0" indent="0" marL="0">
+              <a:buNone/>
+            </a:pPr>
+            <a:r>
+              <a:rPr/>
+              <a:t>Analysis ignoring litter effect, SAS, 2 of 4</a:t>
+            </a:r>
+          </a:p>
+        </p:txBody>
+      </p:sp>
+      <p:pic>
+        <p:nvPicPr>
+          <p:cNvPr descr="sas-01.png" id="0" name="Picture 1"/>
+          <p:cNvPicPr>
+            <a:picLocks noGrp="1" noChangeAspect="1"/>
+          </p:cNvPicPr>
+          <p:nvPr/>
+        </p:nvPicPr>
+        <p:blipFill>
+          <a:blip r:embed="rId2"/>
+          <a:stretch>
+            <a:fillRect/>
+          </a:stretch>
+        </p:blipFill>
+        <p:spPr bwMode="auto">
+          <a:xfrm>
+            <a:off x="457200" y="2095500"/>
+            <a:ext cx="8229600" cy="1587500"/>
+          </a:xfrm>
+          <a:prstGeom prst="rect">
+            <a:avLst/>
+          </a:prstGeom>
+          <a:noFill/>
+          <a:ln w="9525">
+            <a:noFill/>
+            <a:headEnd/>
+            <a:tailEnd/>
+          </a:ln>
+        </p:spPr>
+      </p:pic>
+    </p:spTree>
+  </p:cSld>
+</p:sld>
+</file>
+
+<file path=ppt/slides/slide36.xml><?xml version="1.0" encoding="utf-8"?>
+<p:sld xmlns:a="http://schemas.openxmlformats.org/drawingml/2006/main" xmlns:r="http://schemas.openxmlformats.org/officeDocument/2006/relationships" xmlns:p="http://schemas.openxmlformats.org/presentationml/2006/main">
+  <p:cSld>
+    <p:spTree>
+      <p:nvGrpSpPr>
+        <p:cNvPr id="1" name=""/>
+        <p:cNvGrpSpPr/>
+        <p:nvPr/>
+      </p:nvGrpSpPr>
+      <p:grpSpPr>
+        <a:xfrm>
+          <a:off x="0" y="0"/>
+          <a:ext cx="0" cy="0"/>
+          <a:chOff x="0" y="0"/>
+          <a:chExt cx="0" cy="0"/>
+        </a:xfrm>
+      </p:grpSpPr>
+      <p:sp>
+        <p:nvSpPr>
+          <p:cNvPr id="2" name="Title 1"/>
+          <p:cNvSpPr>
+            <a:spLocks noGrp="1"/>
+          </p:cNvSpPr>
+          <p:nvPr>
+            <p:ph type="title"/>
+          </p:nvPr>
+        </p:nvSpPr>
+        <p:spPr/>
+        <p:txBody>
+          <a:bodyPr/>
+          <a:lstStyle/>
+          <a:p>
+            <a:pPr lvl="0" indent="0" marL="0">
+              <a:buNone/>
+            </a:pPr>
+            <a:r>
+              <a:rPr/>
+              <a:t>Analysis ignoring litter effect, SAS, 3 of 4</a:t>
+            </a:r>
+          </a:p>
+        </p:txBody>
+      </p:sp>
+      <p:pic>
+        <p:nvPicPr>
+          <p:cNvPr descr="sas-02.png" id="0" name="Picture 1"/>
+          <p:cNvPicPr>
+            <a:picLocks noGrp="1" noChangeAspect="1"/>
+          </p:cNvPicPr>
+          <p:nvPr/>
+        </p:nvPicPr>
+        <p:blipFill>
+          <a:blip r:embed="rId2"/>
+          <a:stretch>
+            <a:fillRect/>
+          </a:stretch>
+        </p:blipFill>
+        <p:spPr bwMode="auto">
+          <a:xfrm>
+            <a:off x="457200" y="2146300"/>
+            <a:ext cx="8229600" cy="1473200"/>
+          </a:xfrm>
+          <a:prstGeom prst="rect">
+            <a:avLst/>
+          </a:prstGeom>
+          <a:noFill/>
+          <a:ln w="9525">
+            <a:noFill/>
+            <a:headEnd/>
+            <a:tailEnd/>
+          </a:ln>
+        </p:spPr>
+      </p:pic>
+    </p:spTree>
+  </p:cSld>
+</p:sld>
+</file>
+
+<file path=ppt/slides/slide37.xml><?xml version="1.0" encoding="utf-8"?>
+<p:sld xmlns:a="http://schemas.openxmlformats.org/drawingml/2006/main" xmlns:r="http://schemas.openxmlformats.org/officeDocument/2006/relationships" xmlns:p="http://schemas.openxmlformats.org/presentationml/2006/main">
+  <p:cSld>
+    <p:spTree>
+      <p:nvGrpSpPr>
+        <p:cNvPr id="1" name=""/>
+        <p:cNvGrpSpPr/>
+        <p:nvPr/>
+      </p:nvGrpSpPr>
+      <p:grpSpPr>
+        <a:xfrm>
+          <a:off x="0" y="0"/>
+          <a:ext cx="0" cy="0"/>
+          <a:chOff x="0" y="0"/>
+          <a:chExt cx="0" cy="0"/>
+        </a:xfrm>
+      </p:grpSpPr>
+      <p:sp>
+        <p:nvSpPr>
+          <p:cNvPr id="2" name="Title 1"/>
+          <p:cNvSpPr>
+            <a:spLocks noGrp="1"/>
+          </p:cNvSpPr>
+          <p:nvPr>
+            <p:ph type="title"/>
+          </p:nvPr>
+        </p:nvSpPr>
+        <p:spPr/>
+        <p:txBody>
+          <a:bodyPr/>
+          <a:lstStyle/>
+          <a:p>
+            <a:pPr lvl="0" indent="0" marL="0">
+              <a:buNone/>
+            </a:pPr>
+            <a:r>
+              <a:rPr/>
+              <a:t>Analysis ignoring litter effect, SAS, 4 of 4</a:t>
+            </a:r>
+          </a:p>
+        </p:txBody>
+      </p:sp>
+      <p:pic>
+        <p:nvPicPr>
+          <p:cNvPr descr="sas-03.png" id="0" name="Picture 1"/>
+          <p:cNvPicPr>
+            <a:picLocks noGrp="1" noChangeAspect="1"/>
+          </p:cNvPicPr>
+          <p:nvPr/>
+        </p:nvPicPr>
+        <p:blipFill>
+          <a:blip r:embed="rId2"/>
+          <a:stretch>
+            <a:fillRect/>
+          </a:stretch>
+        </p:blipFill>
+        <p:spPr bwMode="auto">
+          <a:xfrm>
+            <a:off x="457200" y="2336800"/>
+            <a:ext cx="8229600" cy="1117600"/>
+          </a:xfrm>
+          <a:prstGeom prst="rect">
+            <a:avLst/>
+          </a:prstGeom>
+          <a:noFill/>
+          <a:ln w="9525">
+            <a:noFill/>
+            <a:headEnd/>
+            <a:tailEnd/>
+          </a:ln>
+        </p:spPr>
+      </p:pic>
+    </p:spTree>
+  </p:cSld>
+</p:sld>
+</file>
+
+<file path=ppt/slides/slide38.xml><?xml version="1.0" encoding="utf-8"?>
+<p:sld xmlns:a="http://schemas.openxmlformats.org/drawingml/2006/main" xmlns:r="http://schemas.openxmlformats.org/officeDocument/2006/relationships" xmlns:p="http://schemas.openxmlformats.org/presentationml/2006/main">
+  <p:cSld>
+    <p:spTree>
+      <p:nvGrpSpPr>
+        <p:cNvPr id="1" name=""/>
+        <p:cNvGrpSpPr/>
+        <p:nvPr/>
+      </p:nvGrpSpPr>
+      <p:grpSpPr>
+        <a:xfrm>
+          <a:off x="0" y="0"/>
+          <a:ext cx="0" cy="0"/>
+          <a:chOff x="0" y="0"/>
+          <a:chExt cx="0" cy="0"/>
+        </a:xfrm>
+      </p:grpSpPr>
+      <p:sp>
+        <p:nvSpPr>
+          <p:cNvPr id="2" name="Title 1"/>
+          <p:cNvSpPr>
+            <a:spLocks noGrp="1"/>
+          </p:cNvSpPr>
+          <p:nvPr>
+            <p:ph type="title"/>
+          </p:nvPr>
+        </p:nvSpPr>
+        <p:spPr/>
+        <p:txBody>
+          <a:bodyPr/>
+          <a:lstStyle/>
+          <a:p>
+            <a:pPr lvl="0" indent="0" marL="0">
+              <a:buNone/>
+            </a:pPr>
+            <a:r>
+              <a:rPr/>
+              <a:t>Analysis ignoring litter effect, R, 1 of 3</a:t>
+            </a:r>
+          </a:p>
+        </p:txBody>
+      </p:sp>
+      <p:sp>
+        <p:nvSpPr>
+          <p:cNvPr id="3" name="Content Placeholder 2"/>
+          <p:cNvSpPr>
+            <a:spLocks noGrp="1"/>
+          </p:cNvSpPr>
+          <p:nvPr>
+            <p:ph idx="1"/>
+          </p:nvPr>
+        </p:nvSpPr>
+        <p:spPr/>
+        <p:txBody>
+          <a:bodyPr/>
+          <a:lstStyle/>
+          <a:p>
+            <a:pPr lvl="0" indent="0">
+              <a:buNone/>
+            </a:pPr>
+            <a:r>
+              <a:rPr>
+                <a:latin typeface="Courier"/>
+              </a:rPr>
+              <a:t>rats_surv &lt;- Surv(rats$time, rats$status)
+coxph(rats_surv ~ rx, data=rats)</a:t>
+            </a:r>
+          </a:p>
+        </p:txBody>
+      </p:sp>
+    </p:spTree>
+  </p:cSld>
+</p:sld>
+</file>
+
+<file path=ppt/slides/slide39.xml><?xml version="1.0" encoding="utf-8"?>
+<p:sld xmlns:a="http://schemas.openxmlformats.org/drawingml/2006/main" xmlns:r="http://schemas.openxmlformats.org/officeDocument/2006/relationships" xmlns:p="http://schemas.openxmlformats.org/presentationml/2006/main">
+  <p:cSld>
+    <p:spTree>
+      <p:nvGrpSpPr>
+        <p:cNvPr id="1" name=""/>
+        <p:cNvGrpSpPr/>
+        <p:nvPr/>
+      </p:nvGrpSpPr>
+      <p:grpSpPr>
+        <a:xfrm>
+          <a:off x="0" y="0"/>
+          <a:ext cx="0" cy="0"/>
+          <a:chOff x="0" y="0"/>
+          <a:chExt cx="0" cy="0"/>
+        </a:xfrm>
+      </p:grpSpPr>
+      <p:sp>
+        <p:nvSpPr>
+          <p:cNvPr id="2" name="Title 1"/>
+          <p:cNvSpPr>
+            <a:spLocks noGrp="1"/>
+          </p:cNvSpPr>
+          <p:nvPr>
+            <p:ph type="title"/>
+          </p:nvPr>
+        </p:nvSpPr>
+        <p:spPr/>
+        <p:txBody>
+          <a:bodyPr/>
+          <a:lstStyle/>
+          <a:p>
+            <a:pPr lvl="0" indent="0" marL="0">
+              <a:buNone/>
+            </a:pPr>
+            <a:r>
+              <a:rPr/>
+              <a:t>Analysis ignoring litter effect, R, 2 of 3</a:t>
+            </a:r>
+          </a:p>
+        </p:txBody>
+      </p:sp>
+      <p:sp>
+        <p:nvSpPr>
+          <p:cNvPr id="3" name="Content Placeholder 2"/>
+          <p:cNvSpPr>
+            <a:spLocks noGrp="1"/>
+          </p:cNvSpPr>
+          <p:nvPr>
+            <p:ph idx="1"/>
+          </p:nvPr>
+        </p:nvSpPr>
+        <p:spPr/>
+        <p:txBody>
+          <a:bodyPr/>
+          <a:lstStyle/>
+          <a:p>
+            <a:pPr lvl="0" indent="0">
+              <a:buNone/>
+            </a:pPr>
+            <a:r>
+              <a:rPr>
+                <a:latin typeface="Courier"/>
+              </a:rPr>
+              <a:t>Call:
+coxph(formula = rats_surv ~ rx, data = rats)
+     coef exp(coef) se(coef)     z      p
+rx 0.7137    2.0416   0.3088 2.311 0.0208</a:t>
             </a:r>
           </a:p>
         </p:txBody>
@@ -8166,6 +9500,777 @@
 </p:sld>
 </file>
 
+<file path=ppt/slides/slide40.xml><?xml version="1.0" encoding="utf-8"?>
+<p:sld xmlns:a="http://schemas.openxmlformats.org/drawingml/2006/main" xmlns:r="http://schemas.openxmlformats.org/officeDocument/2006/relationships" xmlns:p="http://schemas.openxmlformats.org/presentationml/2006/main">
+  <p:cSld>
+    <p:spTree>
+      <p:nvGrpSpPr>
+        <p:cNvPr id="1" name=""/>
+        <p:cNvGrpSpPr/>
+        <p:nvPr/>
+      </p:nvGrpSpPr>
+      <p:grpSpPr>
+        <a:xfrm>
+          <a:off x="0" y="0"/>
+          <a:ext cx="0" cy="0"/>
+          <a:chOff x="0" y="0"/>
+          <a:chExt cx="0" cy="0"/>
+        </a:xfrm>
+      </p:grpSpPr>
+      <p:sp>
+        <p:nvSpPr>
+          <p:cNvPr id="2" name="Title 1"/>
+          <p:cNvSpPr>
+            <a:spLocks noGrp="1"/>
+          </p:cNvSpPr>
+          <p:nvPr>
+            <p:ph type="title"/>
+          </p:nvPr>
+        </p:nvSpPr>
+        <p:spPr/>
+        <p:txBody>
+          <a:bodyPr/>
+          <a:lstStyle/>
+          <a:p>
+            <a:pPr lvl="0" indent="0" marL="0">
+              <a:buNone/>
+            </a:pPr>
+            <a:r>
+              <a:rPr/>
+              <a:t>Analysis ignoring litter effect, R, 3 of 3</a:t>
+            </a:r>
+          </a:p>
+        </p:txBody>
+      </p:sp>
+      <p:sp>
+        <p:nvSpPr>
+          <p:cNvPr id="3" name="Content Placeholder 2"/>
+          <p:cNvSpPr>
+            <a:spLocks noGrp="1"/>
+          </p:cNvSpPr>
+          <p:nvPr>
+            <p:ph idx="1"/>
+          </p:nvPr>
+        </p:nvSpPr>
+        <p:spPr/>
+        <p:txBody>
+          <a:bodyPr/>
+          <a:lstStyle/>
+          <a:p>
+            <a:pPr lvl="0" indent="0">
+              <a:buNone/>
+            </a:pPr>
+            <a:r>
+              <a:rPr>
+                <a:latin typeface="Courier"/>
+              </a:rPr>
+              <a:t>
+Likelihood ratio test=5.23  on 1 df, p=0.02215
+n= 300, number of events= 42 </a:t>
+            </a:r>
+          </a:p>
+        </p:txBody>
+      </p:sp>
+    </p:spTree>
+  </p:cSld>
+</p:sld>
+</file>
+
+<file path=ppt/slides/slide41.xml><?xml version="1.0" encoding="utf-8"?>
+<p:sld xmlns:a="http://schemas.openxmlformats.org/drawingml/2006/main" xmlns:r="http://schemas.openxmlformats.org/officeDocument/2006/relationships" xmlns:p="http://schemas.openxmlformats.org/presentationml/2006/main">
+  <p:cSld>
+    <p:spTree>
+      <p:nvGrpSpPr>
+        <p:cNvPr id="1" name=""/>
+        <p:cNvGrpSpPr/>
+        <p:nvPr/>
+      </p:nvGrpSpPr>
+      <p:grpSpPr>
+        <a:xfrm>
+          <a:off x="0" y="0"/>
+          <a:ext cx="0" cy="0"/>
+          <a:chOff x="0" y="0"/>
+          <a:chExt cx="0" cy="0"/>
+        </a:xfrm>
+      </p:grpSpPr>
+      <p:sp>
+        <p:nvSpPr>
+          <p:cNvPr id="2" name="Title 1"/>
+          <p:cNvSpPr>
+            <a:spLocks noGrp="1"/>
+          </p:cNvSpPr>
+          <p:nvPr>
+            <p:ph type="title"/>
+          </p:nvPr>
+        </p:nvSpPr>
+        <p:spPr/>
+        <p:txBody>
+          <a:bodyPr/>
+          <a:lstStyle/>
+          <a:p>
+            <a:pPr lvl="0" indent="0" marL="0">
+              <a:buNone/>
+            </a:pPr>
+            <a:r>
+              <a:rPr/>
+              <a:t>Analysis with robust variance (sandwich) estimate, Stata, 1 of 2</a:t>
+            </a:r>
+          </a:p>
+        </p:txBody>
+      </p:sp>
+      <p:sp>
+        <p:nvSpPr>
+          <p:cNvPr id="3" name="Content Placeholder 2"/>
+          <p:cNvSpPr>
+            <a:spLocks noGrp="1"/>
+          </p:cNvSpPr>
+          <p:nvPr>
+            <p:ph idx="1"/>
+          </p:nvPr>
+        </p:nvSpPr>
+        <p:spPr/>
+        <p:txBody>
+          <a:bodyPr/>
+          <a:lstStyle/>
+          <a:p>
+            <a:pPr lvl="0" indent="0">
+              <a:buNone/>
+            </a:pPr>
+            <a:r>
+              <a:rPr>
+                <a:latin typeface="Courier"/>
+              </a:rPr>
+              <a:t>stset time, failure(status)
+stcox rx, vce(cluster litter)</a:t>
+            </a:r>
+          </a:p>
+        </p:txBody>
+      </p:sp>
+    </p:spTree>
+  </p:cSld>
+</p:sld>
+</file>
+
+<file path=ppt/slides/slide42.xml><?xml version="1.0" encoding="utf-8"?>
+<p:sld xmlns:a="http://schemas.openxmlformats.org/drawingml/2006/main" xmlns:r="http://schemas.openxmlformats.org/officeDocument/2006/relationships" xmlns:p="http://schemas.openxmlformats.org/presentationml/2006/main">
+  <p:cSld>
+    <p:spTree>
+      <p:nvGrpSpPr>
+        <p:cNvPr id="1" name=""/>
+        <p:cNvGrpSpPr/>
+        <p:nvPr/>
+      </p:nvGrpSpPr>
+      <p:grpSpPr>
+        <a:xfrm>
+          <a:off x="0" y="0"/>
+          <a:ext cx="0" cy="0"/>
+          <a:chOff x="0" y="0"/>
+          <a:chExt cx="0" cy="0"/>
+        </a:xfrm>
+      </p:grpSpPr>
+      <p:sp>
+        <p:nvSpPr>
+          <p:cNvPr id="2" name="Title 1"/>
+          <p:cNvSpPr>
+            <a:spLocks noGrp="1"/>
+          </p:cNvSpPr>
+          <p:nvPr>
+            <p:ph type="title"/>
+          </p:nvPr>
+        </p:nvSpPr>
+        <p:spPr/>
+        <p:txBody>
+          <a:bodyPr/>
+          <a:lstStyle/>
+          <a:p>
+            <a:pPr lvl="0" indent="0" marL="0">
+              <a:buNone/>
+            </a:pPr>
+            <a:r>
+              <a:rPr/>
+              <a:t>Analysis with robust variance (sandwich) estimate, Stata, 2 of 2</a:t>
+            </a:r>
+          </a:p>
+        </p:txBody>
+      </p:sp>
+      <p:pic>
+        <p:nvPicPr>
+          <p:cNvPr descr="stata-02.png" id="0" name="Picture 1"/>
+          <p:cNvPicPr>
+            <a:picLocks noGrp="1" noChangeAspect="1"/>
+          </p:cNvPicPr>
+          <p:nvPr/>
+        </p:nvPicPr>
+        <p:blipFill>
+          <a:blip r:embed="rId2"/>
+          <a:stretch>
+            <a:fillRect/>
+          </a:stretch>
+        </p:blipFill>
+        <p:spPr bwMode="auto">
+          <a:xfrm>
+            <a:off x="457200" y="1282700"/>
+            <a:ext cx="8229600" cy="3200400"/>
+          </a:xfrm>
+          <a:prstGeom prst="rect">
+            <a:avLst/>
+          </a:prstGeom>
+          <a:noFill/>
+          <a:ln w="9525">
+            <a:noFill/>
+            <a:headEnd/>
+            <a:tailEnd/>
+          </a:ln>
+        </p:spPr>
+      </p:pic>
+    </p:spTree>
+  </p:cSld>
+</p:sld>
+</file>
+
+<file path=ppt/slides/slide43.xml><?xml version="1.0" encoding="utf-8"?>
+<p:sld xmlns:a="http://schemas.openxmlformats.org/drawingml/2006/main" xmlns:r="http://schemas.openxmlformats.org/officeDocument/2006/relationships" xmlns:p="http://schemas.openxmlformats.org/presentationml/2006/main">
+  <p:cSld>
+    <p:spTree>
+      <p:nvGrpSpPr>
+        <p:cNvPr id="1" name=""/>
+        <p:cNvGrpSpPr/>
+        <p:nvPr/>
+      </p:nvGrpSpPr>
+      <p:grpSpPr>
+        <a:xfrm>
+          <a:off x="0" y="0"/>
+          <a:ext cx="0" cy="0"/>
+          <a:chOff x="0" y="0"/>
+          <a:chExt cx="0" cy="0"/>
+        </a:xfrm>
+      </p:grpSpPr>
+      <p:sp>
+        <p:nvSpPr>
+          <p:cNvPr id="2" name="Title 1"/>
+          <p:cNvSpPr>
+            <a:spLocks noGrp="1"/>
+          </p:cNvSpPr>
+          <p:nvPr>
+            <p:ph type="title"/>
+          </p:nvPr>
+        </p:nvSpPr>
+        <p:spPr/>
+        <p:txBody>
+          <a:bodyPr/>
+          <a:lstStyle/>
+          <a:p>
+            <a:pPr lvl="0" indent="0" marL="0">
+              <a:buNone/>
+            </a:pPr>
+            <a:r>
+              <a:rPr/>
+              <a:t>Analysis with robust variance (sandwich) estimate, SAS, 1 of 4</a:t>
+            </a:r>
+          </a:p>
+        </p:txBody>
+      </p:sp>
+      <p:sp>
+        <p:nvSpPr>
+          <p:cNvPr id="3" name="Content Placeholder 2"/>
+          <p:cNvSpPr>
+            <a:spLocks noGrp="1"/>
+          </p:cNvSpPr>
+          <p:nvPr>
+            <p:ph idx="1"/>
+          </p:nvPr>
+        </p:nvSpPr>
+        <p:spPr/>
+        <p:txBody>
+          <a:bodyPr/>
+          <a:lstStyle/>
+          <a:p>
+            <a:pPr lvl="0" indent="0">
+              <a:buNone/>
+            </a:pPr>
+            <a:r>
+              <a:rPr>
+                <a:latin typeface="Courier"/>
+              </a:rPr>
+              <a:t>proc phreg data=storage.rats covs(aggregate);
+  model time*status(0) = rx;
+  id litter;
+run;</a:t>
+            </a:r>
+          </a:p>
+        </p:txBody>
+      </p:sp>
+    </p:spTree>
+  </p:cSld>
+</p:sld>
+</file>
+
+<file path=ppt/slides/slide44.xml><?xml version="1.0" encoding="utf-8"?>
+<p:sld xmlns:a="http://schemas.openxmlformats.org/drawingml/2006/main" xmlns:r="http://schemas.openxmlformats.org/officeDocument/2006/relationships" xmlns:p="http://schemas.openxmlformats.org/presentationml/2006/main">
+  <p:cSld>
+    <p:spTree>
+      <p:nvGrpSpPr>
+        <p:cNvPr id="1" name=""/>
+        <p:cNvGrpSpPr/>
+        <p:nvPr/>
+      </p:nvGrpSpPr>
+      <p:grpSpPr>
+        <a:xfrm>
+          <a:off x="0" y="0"/>
+          <a:ext cx="0" cy="0"/>
+          <a:chOff x="0" y="0"/>
+          <a:chExt cx="0" cy="0"/>
+        </a:xfrm>
+      </p:grpSpPr>
+      <p:sp>
+        <p:nvSpPr>
+          <p:cNvPr id="2" name="Title 1"/>
+          <p:cNvSpPr>
+            <a:spLocks noGrp="1"/>
+          </p:cNvSpPr>
+          <p:nvPr>
+            <p:ph type="title"/>
+          </p:nvPr>
+        </p:nvSpPr>
+        <p:spPr/>
+        <p:txBody>
+          <a:bodyPr/>
+          <a:lstStyle/>
+          <a:p>
+            <a:pPr lvl="0" indent="0" marL="0">
+              <a:buNone/>
+            </a:pPr>
+            <a:r>
+              <a:rPr/>
+              <a:t>Analysis with robust variance (sandwich) estimate, SAS, 2 of 4</a:t>
+            </a:r>
+          </a:p>
+        </p:txBody>
+      </p:sp>
+      <p:pic>
+        <p:nvPicPr>
+          <p:cNvPr descr="sas-04.png" id="0" name="Picture 1"/>
+          <p:cNvPicPr>
+            <a:picLocks noGrp="1" noChangeAspect="1"/>
+          </p:cNvPicPr>
+          <p:nvPr/>
+        </p:nvPicPr>
+        <p:blipFill>
+          <a:blip r:embed="rId2"/>
+          <a:stretch>
+            <a:fillRect/>
+          </a:stretch>
+        </p:blipFill>
+        <p:spPr bwMode="auto">
+          <a:xfrm>
+            <a:off x="457200" y="2082800"/>
+            <a:ext cx="8229600" cy="1625600"/>
+          </a:xfrm>
+          <a:prstGeom prst="rect">
+            <a:avLst/>
+          </a:prstGeom>
+          <a:noFill/>
+          <a:ln w="9525">
+            <a:noFill/>
+            <a:headEnd/>
+            <a:tailEnd/>
+          </a:ln>
+        </p:spPr>
+      </p:pic>
+    </p:spTree>
+  </p:cSld>
+</p:sld>
+</file>
+
+<file path=ppt/slides/slide45.xml><?xml version="1.0" encoding="utf-8"?>
+<p:sld xmlns:a="http://schemas.openxmlformats.org/drawingml/2006/main" xmlns:r="http://schemas.openxmlformats.org/officeDocument/2006/relationships" xmlns:p="http://schemas.openxmlformats.org/presentationml/2006/main">
+  <p:cSld>
+    <p:spTree>
+      <p:nvGrpSpPr>
+        <p:cNvPr id="1" name=""/>
+        <p:cNvGrpSpPr/>
+        <p:nvPr/>
+      </p:nvGrpSpPr>
+      <p:grpSpPr>
+        <a:xfrm>
+          <a:off x="0" y="0"/>
+          <a:ext cx="0" cy="0"/>
+          <a:chOff x="0" y="0"/>
+          <a:chExt cx="0" cy="0"/>
+        </a:xfrm>
+      </p:grpSpPr>
+      <p:sp>
+        <p:nvSpPr>
+          <p:cNvPr id="2" name="Title 1"/>
+          <p:cNvSpPr>
+            <a:spLocks noGrp="1"/>
+          </p:cNvSpPr>
+          <p:nvPr>
+            <p:ph type="title"/>
+          </p:nvPr>
+        </p:nvSpPr>
+        <p:spPr/>
+        <p:txBody>
+          <a:bodyPr/>
+          <a:lstStyle/>
+          <a:p>
+            <a:pPr lvl="0" indent="0" marL="0">
+              <a:buNone/>
+            </a:pPr>
+            <a:r>
+              <a:rPr/>
+              <a:t>Analysis with robust variance (sandwich) estimate, SAS, 3 of 4</a:t>
+            </a:r>
+          </a:p>
+        </p:txBody>
+      </p:sp>
+      <p:pic>
+        <p:nvPicPr>
+          <p:cNvPr descr="sas-05.png" id="0" name="Picture 1"/>
+          <p:cNvPicPr>
+            <a:picLocks noGrp="1" noChangeAspect="1"/>
+          </p:cNvPicPr>
+          <p:nvPr/>
+        </p:nvPicPr>
+        <p:blipFill>
+          <a:blip r:embed="rId2"/>
+          <a:stretch>
+            <a:fillRect/>
+          </a:stretch>
+        </p:blipFill>
+        <p:spPr bwMode="auto">
+          <a:xfrm>
+            <a:off x="457200" y="1905000"/>
+            <a:ext cx="8229600" cy="1968500"/>
+          </a:xfrm>
+          <a:prstGeom prst="rect">
+            <a:avLst/>
+          </a:prstGeom>
+          <a:noFill/>
+          <a:ln w="9525">
+            <a:noFill/>
+            <a:headEnd/>
+            <a:tailEnd/>
+          </a:ln>
+        </p:spPr>
+      </p:pic>
+    </p:spTree>
+  </p:cSld>
+</p:sld>
+</file>
+
+<file path=ppt/slides/slide46.xml><?xml version="1.0" encoding="utf-8"?>
+<p:sld xmlns:a="http://schemas.openxmlformats.org/drawingml/2006/main" xmlns:r="http://schemas.openxmlformats.org/officeDocument/2006/relationships" xmlns:p="http://schemas.openxmlformats.org/presentationml/2006/main">
+  <p:cSld>
+    <p:spTree>
+      <p:nvGrpSpPr>
+        <p:cNvPr id="1" name=""/>
+        <p:cNvGrpSpPr/>
+        <p:nvPr/>
+      </p:nvGrpSpPr>
+      <p:grpSpPr>
+        <a:xfrm>
+          <a:off x="0" y="0"/>
+          <a:ext cx="0" cy="0"/>
+          <a:chOff x="0" y="0"/>
+          <a:chExt cx="0" cy="0"/>
+        </a:xfrm>
+      </p:grpSpPr>
+      <p:sp>
+        <p:nvSpPr>
+          <p:cNvPr id="2" name="Title 1"/>
+          <p:cNvSpPr>
+            <a:spLocks noGrp="1"/>
+          </p:cNvSpPr>
+          <p:nvPr>
+            <p:ph type="title"/>
+          </p:nvPr>
+        </p:nvSpPr>
+        <p:spPr/>
+        <p:txBody>
+          <a:bodyPr/>
+          <a:lstStyle/>
+          <a:p>
+            <a:pPr lvl="0" indent="0" marL="0">
+              <a:buNone/>
+            </a:pPr>
+            <a:r>
+              <a:rPr/>
+              <a:t>Analysis with robust variance (sandwich) estimate, SAS, 4 of 4</a:t>
+            </a:r>
+          </a:p>
+        </p:txBody>
+      </p:sp>
+      <p:pic>
+        <p:nvPicPr>
+          <p:cNvPr descr="sas-06.png" id="0" name="Picture 1"/>
+          <p:cNvPicPr>
+            <a:picLocks noGrp="1" noChangeAspect="1"/>
+          </p:cNvPicPr>
+          <p:nvPr/>
+        </p:nvPicPr>
+        <p:blipFill>
+          <a:blip r:embed="rId2"/>
+          <a:stretch>
+            <a:fillRect/>
+          </a:stretch>
+        </p:blipFill>
+        <p:spPr bwMode="auto">
+          <a:xfrm>
+            <a:off x="457200" y="2336800"/>
+            <a:ext cx="8229600" cy="1104900"/>
+          </a:xfrm>
+          <a:prstGeom prst="rect">
+            <a:avLst/>
+          </a:prstGeom>
+          <a:noFill/>
+          <a:ln w="9525">
+            <a:noFill/>
+            <a:headEnd/>
+            <a:tailEnd/>
+          </a:ln>
+        </p:spPr>
+      </p:pic>
+    </p:spTree>
+  </p:cSld>
+</p:sld>
+</file>
+
+<file path=ppt/slides/slide47.xml><?xml version="1.0" encoding="utf-8"?>
+<p:sld xmlns:a="http://schemas.openxmlformats.org/drawingml/2006/main" xmlns:r="http://schemas.openxmlformats.org/officeDocument/2006/relationships" xmlns:p="http://schemas.openxmlformats.org/presentationml/2006/main">
+  <p:cSld>
+    <p:spTree>
+      <p:nvGrpSpPr>
+        <p:cNvPr id="1" name=""/>
+        <p:cNvGrpSpPr/>
+        <p:nvPr/>
+      </p:nvGrpSpPr>
+      <p:grpSpPr>
+        <a:xfrm>
+          <a:off x="0" y="0"/>
+          <a:ext cx="0" cy="0"/>
+          <a:chOff x="0" y="0"/>
+          <a:chExt cx="0" cy="0"/>
+        </a:xfrm>
+      </p:grpSpPr>
+      <p:sp>
+        <p:nvSpPr>
+          <p:cNvPr id="2" name="Title 1"/>
+          <p:cNvSpPr>
+            <a:spLocks noGrp="1"/>
+          </p:cNvSpPr>
+          <p:nvPr>
+            <p:ph type="title"/>
+          </p:nvPr>
+        </p:nvSpPr>
+        <p:spPr/>
+        <p:txBody>
+          <a:bodyPr/>
+          <a:lstStyle/>
+          <a:p>
+            <a:pPr lvl="0" indent="0" marL="0">
+              <a:buNone/>
+            </a:pPr>
+            <a:r>
+              <a:rPr/>
+              <a:t>Analysis with robust variance (sandwich) estimate, R, 1 of 2</a:t>
+            </a:r>
+          </a:p>
+        </p:txBody>
+      </p:sp>
+      <p:sp>
+        <p:nvSpPr>
+          <p:cNvPr id="3" name="Content Placeholder 2"/>
+          <p:cNvSpPr>
+            <a:spLocks noGrp="1"/>
+          </p:cNvSpPr>
+          <p:nvPr>
+            <p:ph idx="1"/>
+          </p:nvPr>
+        </p:nvSpPr>
+        <p:spPr/>
+        <p:txBody>
+          <a:bodyPr/>
+          <a:lstStyle/>
+          <a:p>
+            <a:pPr lvl="0" indent="0">
+              <a:buNone/>
+            </a:pPr>
+            <a:r>
+              <a:rPr>
+                <a:latin typeface="Courier"/>
+              </a:rPr>
+              <a:t>rats_surv &lt;- Surv(rats$time, rats$status)
+coxph(rats_surv ~ rx + cluster(litter), data=rats)</a:t>
+            </a:r>
+          </a:p>
+        </p:txBody>
+      </p:sp>
+    </p:spTree>
+  </p:cSld>
+</p:sld>
+</file>
+
+<file path=ppt/slides/slide48.xml><?xml version="1.0" encoding="utf-8"?>
+<p:sld xmlns:a="http://schemas.openxmlformats.org/drawingml/2006/main" xmlns:r="http://schemas.openxmlformats.org/officeDocument/2006/relationships" xmlns:p="http://schemas.openxmlformats.org/presentationml/2006/main">
+  <p:cSld>
+    <p:spTree>
+      <p:nvGrpSpPr>
+        <p:cNvPr id="1" name=""/>
+        <p:cNvGrpSpPr/>
+        <p:nvPr/>
+      </p:nvGrpSpPr>
+      <p:grpSpPr>
+        <a:xfrm>
+          <a:off x="0" y="0"/>
+          <a:ext cx="0" cy="0"/>
+          <a:chOff x="0" y="0"/>
+          <a:chExt cx="0" cy="0"/>
+        </a:xfrm>
+      </p:grpSpPr>
+      <p:sp>
+        <p:nvSpPr>
+          <p:cNvPr id="2" name="Title 1"/>
+          <p:cNvSpPr>
+            <a:spLocks noGrp="1"/>
+          </p:cNvSpPr>
+          <p:nvPr>
+            <p:ph type="title"/>
+          </p:nvPr>
+        </p:nvSpPr>
+        <p:spPr/>
+        <p:txBody>
+          <a:bodyPr/>
+          <a:lstStyle/>
+          <a:p>
+            <a:pPr lvl="0" indent="0" marL="0">
+              <a:buNone/>
+            </a:pPr>
+            <a:r>
+              <a:rPr/>
+              <a:t>Analysis with robust variance (sandwich) estimate, R, 2 of 2</a:t>
+            </a:r>
+          </a:p>
+        </p:txBody>
+      </p:sp>
+      <p:sp>
+        <p:nvSpPr>
+          <p:cNvPr id="3" name="Content Placeholder 2"/>
+          <p:cNvSpPr>
+            <a:spLocks noGrp="1"/>
+          </p:cNvSpPr>
+          <p:nvPr>
+            <p:ph idx="1"/>
+          </p:nvPr>
+        </p:nvSpPr>
+        <p:spPr/>
+        <p:txBody>
+          <a:bodyPr/>
+          <a:lstStyle/>
+          <a:p>
+            <a:pPr lvl="0" indent="0">
+              <a:buNone/>
+            </a:pPr>
+            <a:r>
+              <a:rPr>
+                <a:latin typeface="Courier"/>
+              </a:rPr>
+              <a:t>Call:
+coxph(formula = rats_surv ~ rx, data = rats, cluster = litter)
+     coef exp(coef) se(coef) robust se     z       p
+rx 0.7137    2.0416   0.3088    0.2710 2.633 0.00845
+Likelihood ratio test=5.23  on 1 df, p=0.02215
+n= 300, number of events= 42 </a:t>
+            </a:r>
+          </a:p>
+        </p:txBody>
+      </p:sp>
+    </p:spTree>
+  </p:cSld>
+</p:sld>
+</file>
+
+<file path=ppt/slides/slide49.xml><?xml version="1.0" encoding="utf-8"?>
+<p:sld xmlns:a="http://schemas.openxmlformats.org/drawingml/2006/main" xmlns:r="http://schemas.openxmlformats.org/officeDocument/2006/relationships" xmlns:p="http://schemas.openxmlformats.org/presentationml/2006/main">
+  <p:cSld>
+    <p:spTree>
+      <p:nvGrpSpPr>
+        <p:cNvPr id="1" name=""/>
+        <p:cNvGrpSpPr/>
+        <p:nvPr/>
+      </p:nvGrpSpPr>
+      <p:grpSpPr>
+        <a:xfrm>
+          <a:off x="0" y="0"/>
+          <a:ext cx="0" cy="0"/>
+          <a:chOff x="0" y="0"/>
+          <a:chExt cx="0" cy="0"/>
+        </a:xfrm>
+      </p:grpSpPr>
+      <p:sp>
+        <p:nvSpPr>
+          <p:cNvPr id="2" name="Title 1"/>
+          <p:cNvSpPr>
+            <a:spLocks noGrp="1"/>
+          </p:cNvSpPr>
+          <p:nvPr>
+            <p:ph type="title"/>
+          </p:nvPr>
+        </p:nvSpPr>
+        <p:spPr/>
+        <p:txBody>
+          <a:bodyPr/>
+          <a:lstStyle/>
+          <a:p>
+            <a:pPr lvl="0" indent="0" marL="0">
+              <a:buNone/>
+            </a:pPr>
+            <a:r>
+              <a:rPr/>
+              <a:t>Thiotepa data</a:t>
+            </a:r>
+          </a:p>
+        </p:txBody>
+      </p:sp>
+      <p:sp>
+        <p:nvSpPr>
+          <p:cNvPr id="3" name="Content Placeholder 2"/>
+          <p:cNvSpPr>
+            <a:spLocks noGrp="1"/>
+          </p:cNvSpPr>
+          <p:nvPr>
+            <p:ph idx="1"/>
+          </p:nvPr>
+        </p:nvSpPr>
+        <p:spPr/>
+        <p:txBody>
+          <a:bodyPr/>
+          <a:lstStyle/>
+          <a:p>
+            <a:pPr lvl="0" indent="0">
+              <a:buNone/>
+            </a:pPr>
+            <a:r>
+              <a:rPr>
+                <a:latin typeface="Courier"/>
+              </a:rPr>
+              <a:t>  id rx number size start stop event enum
+1  1  1      1    3     0    1     0    1
+2  2  1      2    1     0    4     0    1
+3  3  1      1    1     0    7     0    1
+4  4  1      5    1     0   10     0    1
+5  5  1      4    1     0    6     1    1
+6  5  1      4    1     6   10     0    2
+7  6  1      1    1     0   14     0    1</a:t>
+            </a:r>
+          </a:p>
+        </p:txBody>
+      </p:sp>
+    </p:spTree>
+  </p:cSld>
+</p:sld>
+</file>
+
 <file path=ppt/slides/slide5.xml><?xml version="1.0" encoding="utf-8"?>
 <p:sld xmlns:a="http://schemas.openxmlformats.org/drawingml/2006/main" xmlns:r="http://schemas.openxmlformats.org/officeDocument/2006/relationships" xmlns:p="http://schemas.openxmlformats.org/presentationml/2006/main">
   <p:cSld>
@@ -8243,6 +10348,83 @@
           </a:p>
         </p:txBody>
       </p:sp>
+    </p:spTree>
+  </p:cSld>
+</p:sld>
+</file>
+
+<file path=ppt/slides/slide50.xml><?xml version="1.0" encoding="utf-8"?>
+<p:sld xmlns:a="http://schemas.openxmlformats.org/drawingml/2006/main" xmlns:r="http://schemas.openxmlformats.org/officeDocument/2006/relationships" xmlns:p="http://schemas.openxmlformats.org/presentationml/2006/main">
+  <p:cSld>
+    <p:spTree>
+      <p:nvGrpSpPr>
+        <p:cNvPr id="1" name=""/>
+        <p:cNvGrpSpPr/>
+        <p:nvPr/>
+      </p:nvGrpSpPr>
+      <p:grpSpPr>
+        <a:xfrm>
+          <a:off x="0" y="0"/>
+          <a:ext cx="0" cy="0"/>
+          <a:chOff x="0" y="0"/>
+          <a:chExt cx="0" cy="0"/>
+        </a:xfrm>
+      </p:grpSpPr>
+      <p:sp>
+        <p:nvSpPr>
+          <p:cNvPr id="2" name="Title 1"/>
+          <p:cNvSpPr>
+            <a:spLocks noGrp="1"/>
+          </p:cNvSpPr>
+          <p:nvPr>
+            <p:ph type="title"/>
+          </p:nvPr>
+        </p:nvSpPr>
+        <p:spPr/>
+        <p:txBody>
+          <a:bodyPr/>
+          <a:lstStyle/>
+          <a:p>
+            <a:pPr lvl="0" indent="0" marL="0">
+              <a:buNone/>
+            </a:pPr>
+            <a:r>
+              <a:rPr/>
+              <a:t>Plot of thiotepa data</a:t>
+            </a:r>
+          </a:p>
+        </p:txBody>
+      </p:sp>
+      <p:pic>
+        <p:nvPicPr>
+          <p:cNvPr descr="frailty_files/figure-pptx/unnamed-chunk-13-1.png" id="0" name="Picture 1"/>
+          <p:cNvPicPr>
+            <a:picLocks noGrp="1" noChangeAspect="1"/>
+          </p:cNvPicPr>
+          <p:nvPr/>
+        </p:nvPicPr>
+        <p:blipFill>
+          <a:blip r:embed="rId2"/>
+          <a:stretch>
+            <a:fillRect/>
+          </a:stretch>
+        </p:blipFill>
+        <p:spPr bwMode="auto">
+          <a:xfrm>
+            <a:off x="1181100" y="1193800"/>
+            <a:ext cx="6781800" cy="3390900"/>
+          </a:xfrm>
+          <a:prstGeom prst="rect">
+            <a:avLst/>
+          </a:prstGeom>
+          <a:noFill/>
+          <a:ln w="9525">
+            <a:noFill/>
+            <a:headEnd/>
+            <a:tailEnd/>
+          </a:ln>
+        </p:spPr>
+      </p:pic>
     </p:spTree>
   </p:cSld>
 </p:sld>

</xml_diff>